<commit_message>
third presentation prep start
</commit_message>
<xml_diff>
--- a/PPT TEMPLATE.pptx
+++ b/PPT TEMPLATE.pptx
@@ -7,18 +7,21 @@
   <p:notesMasterIdLst>
     <p:notesMasterId r:id="rId13"/>
   </p:notesMasterIdLst>
+  <p:handoutMasterIdLst>
+    <p:handoutMasterId r:id="rId14"/>
+  </p:handoutMasterIdLst>
   <p:sldIdLst>
     <p:sldId id="256" r:id="rId2"/>
-    <p:sldId id="257" r:id="rId3"/>
-    <p:sldId id="258" r:id="rId4"/>
-    <p:sldId id="259" r:id="rId5"/>
-    <p:sldId id="260" r:id="rId6"/>
-    <p:sldId id="262" r:id="rId7"/>
-    <p:sldId id="263" r:id="rId8"/>
-    <p:sldId id="264" r:id="rId9"/>
-    <p:sldId id="265" r:id="rId10"/>
-    <p:sldId id="266" r:id="rId11"/>
-    <p:sldId id="267" r:id="rId12"/>
+    <p:sldId id="268" r:id="rId3"/>
+    <p:sldId id="269" r:id="rId4"/>
+    <p:sldId id="276" r:id="rId5"/>
+    <p:sldId id="270" r:id="rId6"/>
+    <p:sldId id="271" r:id="rId7"/>
+    <p:sldId id="273" r:id="rId8"/>
+    <p:sldId id="272" r:id="rId9"/>
+    <p:sldId id="274" r:id="rId10"/>
+    <p:sldId id="275" r:id="rId11"/>
+    <p:sldId id="278" r:id="rId12"/>
   </p:sldIdLst>
   <p:sldSz cx="12192000" cy="6858000"/>
   <p:notesSz cx="6858000" cy="9144000"/>
@@ -117,7 +120,202 @@
       </a:defRPr>
     </a:lvl9pPr>
   </p:defaultTextStyle>
+  <p:extLst>
+    <p:ext uri="{EFAFB233-063F-42B5-8137-9DF3F51BA10A}">
+      <p15:sldGuideLst xmlns:p15="http://schemas.microsoft.com/office/powerpoint/2012/main"/>
+    </p:ext>
+  </p:extLst>
 </p:presentation>
+</file>
+
+<file path=ppt/handoutMasters/handoutMaster1.xml><?xml version="1.0" encoding="utf-8"?>
+<p:handoutMaster xmlns:a="http://schemas.openxmlformats.org/drawingml/2006/main" xmlns:r="http://schemas.openxmlformats.org/officeDocument/2006/relationships" xmlns:p="http://schemas.openxmlformats.org/presentationml/2006/main">
+  <p:cSld>
+    <p:bg>
+      <p:bgRef idx="1001">
+        <a:schemeClr val="bg1"/>
+      </p:bgRef>
+    </p:bg>
+    <p:spTree>
+      <p:nvGrpSpPr>
+        <p:cNvPr id="1" name=""/>
+        <p:cNvGrpSpPr/>
+        <p:nvPr/>
+      </p:nvGrpSpPr>
+      <p:grpSpPr>
+        <a:xfrm>
+          <a:off x="0" y="0"/>
+          <a:ext cx="0" cy="0"/>
+          <a:chOff x="0" y="0"/>
+          <a:chExt cx="0" cy="0"/>
+        </a:xfrm>
+      </p:grpSpPr>
+      <p:sp>
+        <p:nvSpPr>
+          <p:cNvPr id="2" name="Header Placeholder 1">
+            <a:extLst>
+              <a:ext uri="{FF2B5EF4-FFF2-40B4-BE49-F238E27FC236}">
+                <a16:creationId xmlns:a16="http://schemas.microsoft.com/office/drawing/2014/main" id="{9BCE3A7E-C01D-95F3-953D-10924AFF7C6B}"/>
+              </a:ext>
+            </a:extLst>
+          </p:cNvPr>
+          <p:cNvSpPr>
+            <a:spLocks noGrp="1"/>
+          </p:cNvSpPr>
+          <p:nvPr>
+            <p:ph type="hdr" sz="quarter"/>
+          </p:nvPr>
+        </p:nvSpPr>
+        <p:spPr>
+          <a:xfrm>
+            <a:off x="0" y="0"/>
+            <a:ext cx="2971800" cy="458788"/>
+          </a:xfrm>
+          <a:prstGeom prst="rect">
+            <a:avLst/>
+          </a:prstGeom>
+        </p:spPr>
+        <p:txBody>
+          <a:bodyPr vert="horz" lIns="91440" tIns="45720" rIns="91440" bIns="45720" rtlCol="0"/>
+          <a:lstStyle>
+            <a:lvl1pPr algn="l">
+              <a:defRPr sz="1200"/>
+            </a:lvl1pPr>
+          </a:lstStyle>
+          <a:p>
+            <a:endParaRPr lang="en-IN"/>
+          </a:p>
+        </p:txBody>
+      </p:sp>
+      <p:sp>
+        <p:nvSpPr>
+          <p:cNvPr id="3" name="Date Placeholder 2">
+            <a:extLst>
+              <a:ext uri="{FF2B5EF4-FFF2-40B4-BE49-F238E27FC236}">
+                <a16:creationId xmlns:a16="http://schemas.microsoft.com/office/drawing/2014/main" id="{5568DF76-461C-0DF9-C6AC-C76390BAB2AB}"/>
+              </a:ext>
+            </a:extLst>
+          </p:cNvPr>
+          <p:cNvSpPr>
+            <a:spLocks noGrp="1"/>
+          </p:cNvSpPr>
+          <p:nvPr>
+            <p:ph type="dt" sz="quarter" idx="1"/>
+          </p:nvPr>
+        </p:nvSpPr>
+        <p:spPr>
+          <a:xfrm>
+            <a:off x="3884613" y="0"/>
+            <a:ext cx="2971800" cy="458788"/>
+          </a:xfrm>
+          <a:prstGeom prst="rect">
+            <a:avLst/>
+          </a:prstGeom>
+        </p:spPr>
+        <p:txBody>
+          <a:bodyPr vert="horz" lIns="91440" tIns="45720" rIns="91440" bIns="45720" rtlCol="0"/>
+          <a:lstStyle>
+            <a:lvl1pPr algn="r">
+              <a:defRPr sz="1200"/>
+            </a:lvl1pPr>
+          </a:lstStyle>
+          <a:p>
+            <a:fld id="{B43582BA-7EFE-407E-89C4-0B93D6902EB6}" type="datetimeFigureOut">
+              <a:rPr lang="en-IN" smtClean="0"/>
+              <a:t>21-03-2025</a:t>
+            </a:fld>
+            <a:endParaRPr lang="en-IN"/>
+          </a:p>
+        </p:txBody>
+      </p:sp>
+      <p:sp>
+        <p:nvSpPr>
+          <p:cNvPr id="4" name="Footer Placeholder 3">
+            <a:extLst>
+              <a:ext uri="{FF2B5EF4-FFF2-40B4-BE49-F238E27FC236}">
+                <a16:creationId xmlns:a16="http://schemas.microsoft.com/office/drawing/2014/main" id="{9C73B6F2-060B-2A7D-7267-3DD694FDFB0A}"/>
+              </a:ext>
+            </a:extLst>
+          </p:cNvPr>
+          <p:cNvSpPr>
+            <a:spLocks noGrp="1"/>
+          </p:cNvSpPr>
+          <p:nvPr>
+            <p:ph type="ftr" sz="quarter" idx="2"/>
+          </p:nvPr>
+        </p:nvSpPr>
+        <p:spPr>
+          <a:xfrm>
+            <a:off x="0" y="8685213"/>
+            <a:ext cx="2971800" cy="458787"/>
+          </a:xfrm>
+          <a:prstGeom prst="rect">
+            <a:avLst/>
+          </a:prstGeom>
+        </p:spPr>
+        <p:txBody>
+          <a:bodyPr vert="horz" lIns="91440" tIns="45720" rIns="91440" bIns="45720" rtlCol="0" anchor="b"/>
+          <a:lstStyle>
+            <a:lvl1pPr algn="l">
+              <a:defRPr sz="1200"/>
+            </a:lvl1pPr>
+          </a:lstStyle>
+          <a:p>
+            <a:endParaRPr lang="en-IN"/>
+          </a:p>
+        </p:txBody>
+      </p:sp>
+      <p:sp>
+        <p:nvSpPr>
+          <p:cNvPr id="5" name="Slide Number Placeholder 4">
+            <a:extLst>
+              <a:ext uri="{FF2B5EF4-FFF2-40B4-BE49-F238E27FC236}">
+                <a16:creationId xmlns:a16="http://schemas.microsoft.com/office/drawing/2014/main" id="{E10BA839-3ABC-5C0D-B49D-B8F36CE4D45B}"/>
+              </a:ext>
+            </a:extLst>
+          </p:cNvPr>
+          <p:cNvSpPr>
+            <a:spLocks noGrp="1"/>
+          </p:cNvSpPr>
+          <p:nvPr>
+            <p:ph type="sldNum" sz="quarter" idx="3"/>
+          </p:nvPr>
+        </p:nvSpPr>
+        <p:spPr>
+          <a:xfrm>
+            <a:off x="3884613" y="8685213"/>
+            <a:ext cx="2971800" cy="458787"/>
+          </a:xfrm>
+          <a:prstGeom prst="rect">
+            <a:avLst/>
+          </a:prstGeom>
+        </p:spPr>
+        <p:txBody>
+          <a:bodyPr vert="horz" lIns="91440" tIns="45720" rIns="91440" bIns="45720" rtlCol="0" anchor="b"/>
+          <a:lstStyle>
+            <a:lvl1pPr algn="r">
+              <a:defRPr sz="1200"/>
+            </a:lvl1pPr>
+          </a:lstStyle>
+          <a:p>
+            <a:fld id="{BA3285F1-9BFD-45D1-BC78-62ED228D7053}" type="slidenum">
+              <a:rPr lang="en-IN" smtClean="0"/>
+              <a:t>‹#›</a:t>
+            </a:fld>
+            <a:endParaRPr lang="en-IN"/>
+          </a:p>
+        </p:txBody>
+      </p:sp>
+    </p:spTree>
+    <p:extLst>
+      <p:ext uri="{BB962C8B-B14F-4D97-AF65-F5344CB8AC3E}">
+        <p14:creationId xmlns:p14="http://schemas.microsoft.com/office/powerpoint/2010/main" val="2584704490"/>
+      </p:ext>
+    </p:extLst>
+  </p:cSld>
+  <p:clrMap bg1="lt1" tx1="dk1" bg2="lt2" tx2="dk2" accent1="accent1" accent2="accent2" accent3="accent3" accent4="accent4" accent5="accent5" accent6="accent6" hlink="hlink" folHlink="folHlink"/>
+  <p:hf ftr="0" dt="0"/>
+</p:handoutMaster>
 </file>
 
 <file path=ppt/notesMasters/notesMaster1.xml><?xml version="1.0" encoding="utf-8"?>
@@ -202,7 +400,7 @@
           <a:p>
             <a:fld id="{4B593DB3-DD50-4BCB-808F-056A97D70943}" type="datetimeFigureOut">
               <a:rPr lang="en-IN" smtClean="0"/>
-              <a:t>24-08-2024</a:t>
+              <a:t>21-03-2025</a:t>
             </a:fld>
             <a:endParaRPr lang="en-IN"/>
           </a:p>
@@ -375,6 +573,7 @@
     </p:extLst>
   </p:cSld>
   <p:clrMap bg1="lt1" tx1="dk1" bg2="lt2" tx2="dk2" accent1="accent1" accent2="accent2" accent3="accent3" accent4="accent4" accent5="accent5" accent6="accent6" hlink="hlink" folHlink="folHlink"/>
+  <p:hf ftr="0" dt="0"/>
   <p:notesStyle>
     <a:lvl1pPr marL="0" algn="l" defTabSz="914400" rtl="0" eaLnBrk="1" latinLnBrk="0" hangingPunct="1">
       <a:defRPr sz="1200" kern="1200">
@@ -619,7 +818,7 @@
           <a:p>
             <a:fld id="{EFD6C7B9-7CC0-4911-9AF6-AED46E45886F}" type="datetimeFigureOut">
               <a:rPr lang="en-IN" smtClean="0"/>
-              <a:t>24-08-2024</a:t>
+              <a:t>21-03-2025</a:t>
             </a:fld>
             <a:endParaRPr lang="en-IN"/>
           </a:p>
@@ -819,7 +1018,7 @@
           <a:p>
             <a:fld id="{EFD6C7B9-7CC0-4911-9AF6-AED46E45886F}" type="datetimeFigureOut">
               <a:rPr lang="en-IN" smtClean="0"/>
-              <a:t>24-08-2024</a:t>
+              <a:t>21-03-2025</a:t>
             </a:fld>
             <a:endParaRPr lang="en-IN"/>
           </a:p>
@@ -1029,7 +1228,7 @@
           <a:p>
             <a:fld id="{EFD6C7B9-7CC0-4911-9AF6-AED46E45886F}" type="datetimeFigureOut">
               <a:rPr lang="en-IN" smtClean="0"/>
-              <a:t>24-08-2024</a:t>
+              <a:t>21-03-2025</a:t>
             </a:fld>
             <a:endParaRPr lang="en-IN"/>
           </a:p>
@@ -1229,7 +1428,7 @@
           <a:p>
             <a:fld id="{EFD6C7B9-7CC0-4911-9AF6-AED46E45886F}" type="datetimeFigureOut">
               <a:rPr lang="en-IN" smtClean="0"/>
-              <a:t>24-08-2024</a:t>
+              <a:t>21-03-2025</a:t>
             </a:fld>
             <a:endParaRPr lang="en-IN"/>
           </a:p>
@@ -1505,7 +1704,7 @@
           <a:p>
             <a:fld id="{EFD6C7B9-7CC0-4911-9AF6-AED46E45886F}" type="datetimeFigureOut">
               <a:rPr lang="en-IN" smtClean="0"/>
-              <a:t>24-08-2024</a:t>
+              <a:t>21-03-2025</a:t>
             </a:fld>
             <a:endParaRPr lang="en-IN"/>
           </a:p>
@@ -1773,7 +1972,7 @@
           <a:p>
             <a:fld id="{EFD6C7B9-7CC0-4911-9AF6-AED46E45886F}" type="datetimeFigureOut">
               <a:rPr lang="en-IN" smtClean="0"/>
-              <a:t>24-08-2024</a:t>
+              <a:t>21-03-2025</a:t>
             </a:fld>
             <a:endParaRPr lang="en-IN"/>
           </a:p>
@@ -2188,7 +2387,7 @@
           <a:p>
             <a:fld id="{EFD6C7B9-7CC0-4911-9AF6-AED46E45886F}" type="datetimeFigureOut">
               <a:rPr lang="en-IN" smtClean="0"/>
-              <a:t>24-08-2024</a:t>
+              <a:t>21-03-2025</a:t>
             </a:fld>
             <a:endParaRPr lang="en-IN"/>
           </a:p>
@@ -2330,7 +2529,7 @@
           <a:p>
             <a:fld id="{EFD6C7B9-7CC0-4911-9AF6-AED46E45886F}" type="datetimeFigureOut">
               <a:rPr lang="en-IN" smtClean="0"/>
-              <a:t>24-08-2024</a:t>
+              <a:t>21-03-2025</a:t>
             </a:fld>
             <a:endParaRPr lang="en-IN"/>
           </a:p>
@@ -2443,7 +2642,7 @@
           <a:p>
             <a:fld id="{EFD6C7B9-7CC0-4911-9AF6-AED46E45886F}" type="datetimeFigureOut">
               <a:rPr lang="en-IN" smtClean="0"/>
-              <a:t>24-08-2024</a:t>
+              <a:t>21-03-2025</a:t>
             </a:fld>
             <a:endParaRPr lang="en-IN"/>
           </a:p>
@@ -2756,7 +2955,7 @@
           <a:p>
             <a:fld id="{EFD6C7B9-7CC0-4911-9AF6-AED46E45886F}" type="datetimeFigureOut">
               <a:rPr lang="en-IN" smtClean="0"/>
-              <a:t>24-08-2024</a:t>
+              <a:t>21-03-2025</a:t>
             </a:fld>
             <a:endParaRPr lang="en-IN"/>
           </a:p>
@@ -3045,7 +3244,7 @@
           <a:p>
             <a:fld id="{EFD6C7B9-7CC0-4911-9AF6-AED46E45886F}" type="datetimeFigureOut">
               <a:rPr lang="en-IN" smtClean="0"/>
-              <a:t>24-08-2024</a:t>
+              <a:t>21-03-2025</a:t>
             </a:fld>
             <a:endParaRPr lang="en-IN"/>
           </a:p>
@@ -3288,7 +3487,7 @@
           <a:p>
             <a:fld id="{EFD6C7B9-7CC0-4911-9AF6-AED46E45886F}" type="datetimeFigureOut">
               <a:rPr lang="en-IN" smtClean="0"/>
-              <a:t>24-08-2024</a:t>
+              <a:t>21-03-2025</a:t>
             </a:fld>
             <a:endParaRPr lang="en-IN"/>
           </a:p>
@@ -3751,8 +3950,8 @@
         </p:nvSpPr>
         <p:spPr>
           <a:xfrm>
-            <a:off x="586409" y="1769164"/>
-            <a:ext cx="10972800" cy="4552119"/>
+            <a:off x="586409" y="1376739"/>
+            <a:ext cx="10972800" cy="5322011"/>
           </a:xfrm>
         </p:spPr>
         <p:txBody>
@@ -3762,24 +3961,33 @@
           <a:lstStyle/>
           <a:p>
             <a:r>
+              <a:rPr lang="en-IN" sz="5400" dirty="0">
+                <a:latin typeface="Trebuchet MS" panose="020B0603020202020204" pitchFamily="34" charset="0"/>
+              </a:rPr>
+              <a:t>Major Project Presentation</a:t>
+            </a:r>
+            <a:endParaRPr lang="en-IN" sz="3200" b="1" dirty="0">
+              <a:latin typeface="Trebuchet MS" panose="020B0603020202020204" pitchFamily="34" charset="0"/>
+            </a:endParaRPr>
+          </a:p>
+          <a:p>
+            <a:r>
+              <a:rPr lang="en-IN" sz="3600" b="1" dirty="0">
+                <a:latin typeface="Trebuchet MS" panose="020B0603020202020204" pitchFamily="34" charset="0"/>
+              </a:rPr>
+              <a:t>PROJECT TITLE</a:t>
+            </a:r>
+            <a:r>
               <a:rPr lang="en-IN" sz="3600" b="1" dirty="0"/>
-              <a:t>PROJECT TITLE </a:t>
+              <a:t> </a:t>
             </a:r>
           </a:p>
           <a:p>
             <a:endParaRPr lang="en-IN" sz="3200" dirty="0"/>
           </a:p>
           <a:p>
-            <a:r>
-              <a:rPr lang="en-IN" sz="3200" dirty="0"/>
-              <a:t>Name of Students                                     AKTU Roll numbers</a:t>
-            </a:r>
-          </a:p>
-          <a:p>
-            <a:r>
-              <a:rPr lang="en-IN" dirty="0"/>
-              <a:t>&lt;ABC&gt;                                                                                         2101010000000</a:t>
-            </a:r>
+            <a:pPr algn="l"/>
+            <a:endParaRPr lang="en-IN" sz="2800" dirty="0"/>
           </a:p>
           <a:p>
             <a:endParaRPr lang="en-IN" dirty="0"/>
@@ -3788,21 +3996,27 @@
             <a:endParaRPr lang="en-IN" dirty="0"/>
           </a:p>
           <a:p>
-            <a:endParaRPr lang="en-IN" dirty="0"/>
-          </a:p>
-          <a:p>
-            <a:r>
-              <a:rPr lang="en-IN" dirty="0"/>
-              <a:t>Under Supervision</a:t>
-            </a:r>
-          </a:p>
-          <a:p>
-            <a:r>
-              <a:rPr lang="en-IN" dirty="0" err="1"/>
+            <a:endParaRPr lang="en-IN" b="1" dirty="0"/>
+          </a:p>
+          <a:p>
+            <a:r>
+              <a:rPr lang="en-IN" b="1" dirty="0">
+                <a:latin typeface="Trebuchet MS" panose="020B0603020202020204" pitchFamily="34" charset="0"/>
+              </a:rPr>
+              <a:t>Under Supervision of</a:t>
+            </a:r>
+          </a:p>
+          <a:p>
+            <a:r>
+              <a:rPr lang="en-IN" dirty="0" err="1">
+                <a:latin typeface="Trebuchet MS" panose="020B0603020202020204" pitchFamily="34" charset="0"/>
+              </a:rPr>
               <a:t>Dr.</a:t>
             </a:r>
             <a:r>
-              <a:rPr lang="en-IN" dirty="0"/>
+              <a:rPr lang="en-IN" dirty="0">
+                <a:latin typeface="Trebuchet MS" panose="020B0603020202020204" pitchFamily="34" charset="0"/>
+              </a:rPr>
               <a:t> / Mr. / Ms. &lt;      &gt; </a:t>
             </a:r>
           </a:p>
@@ -3838,8 +4052,8 @@
         </p:blipFill>
         <p:spPr>
           <a:xfrm>
-            <a:off x="288234" y="296620"/>
-            <a:ext cx="3643313" cy="1171575"/>
+            <a:off x="288234" y="296621"/>
+            <a:ext cx="2290579" cy="736578"/>
           </a:xfrm>
         </p:spPr>
       </p:pic>
@@ -3871,8 +4085,8 @@
         </p:blipFill>
         <p:spPr>
           <a:xfrm>
-            <a:off x="9488142" y="58459"/>
-            <a:ext cx="2657475" cy="1468439"/>
+            <a:off x="10777591" y="140651"/>
+            <a:ext cx="1368026" cy="884123"/>
           </a:xfrm>
           <a:prstGeom prst="rect">
             <a:avLst/>
@@ -3893,7 +4107,450 @@
         </p:nvCxnSpPr>
         <p:spPr>
           <a:xfrm>
-            <a:off x="0" y="1648031"/>
+            <a:off x="0" y="1105981"/>
+            <a:ext cx="12145617" cy="0"/>
+          </a:xfrm>
+          <a:prstGeom prst="line">
+            <a:avLst/>
+          </a:prstGeom>
+          <a:scene3d>
+            <a:camera prst="orthographicFront"/>
+            <a:lightRig rig="threePt" dir="t"/>
+          </a:scene3d>
+          <a:sp3d extrusionH="50800" contourW="19050">
+            <a:bevelT w="95250"/>
+            <a:bevelB w="114300"/>
+          </a:sp3d>
+        </p:spPr>
+        <p:style>
+          <a:lnRef idx="1">
+            <a:schemeClr val="accent1"/>
+          </a:lnRef>
+          <a:fillRef idx="0">
+            <a:schemeClr val="accent1"/>
+          </a:fillRef>
+          <a:effectRef idx="0">
+            <a:schemeClr val="accent1"/>
+          </a:effectRef>
+          <a:fontRef idx="minor">
+            <a:schemeClr val="tx1"/>
+          </a:fontRef>
+        </p:style>
+      </p:cxnSp>
+      <p:sp>
+        <p:nvSpPr>
+          <p:cNvPr id="3" name="Rectangle 2">
+            <a:extLst>
+              <a:ext uri="{FF2B5EF4-FFF2-40B4-BE49-F238E27FC236}">
+                <a16:creationId xmlns:a16="http://schemas.microsoft.com/office/drawing/2014/main" id="{617E1CBB-AF57-3F2D-3AD0-7A6F5C29C0A9}"/>
+              </a:ext>
+            </a:extLst>
+          </p:cNvPr>
+          <p:cNvSpPr/>
+          <p:nvPr/>
+        </p:nvSpPr>
+        <p:spPr>
+          <a:xfrm>
+            <a:off x="2301410" y="3089032"/>
+            <a:ext cx="3708971" cy="2037771"/>
+          </a:xfrm>
+          <a:prstGeom prst="rect">
+            <a:avLst/>
+          </a:prstGeom>
+          <a:ln>
+            <a:noFill/>
+          </a:ln>
+        </p:spPr>
+        <p:style>
+          <a:lnRef idx="2">
+            <a:schemeClr val="accent6"/>
+          </a:lnRef>
+          <a:fillRef idx="1">
+            <a:schemeClr val="lt1"/>
+          </a:fillRef>
+          <a:effectRef idx="0">
+            <a:schemeClr val="accent6"/>
+          </a:effectRef>
+          <a:fontRef idx="minor">
+            <a:schemeClr val="dk1"/>
+          </a:fontRef>
+        </p:style>
+        <p:txBody>
+          <a:bodyPr rtlCol="0" anchor="ctr"/>
+          <a:lstStyle/>
+          <a:p>
+            <a:pPr algn="just"/>
+            <a:r>
+              <a:rPr lang="en-US" sz="2400" dirty="0">
+                <a:latin typeface="Trebuchet MS" panose="020B0603020202020204" pitchFamily="34" charset="0"/>
+              </a:rPr>
+              <a:t>Name of student-1</a:t>
+            </a:r>
+          </a:p>
+          <a:p>
+            <a:pPr algn="just"/>
+            <a:r>
+              <a:rPr lang="en-US" sz="2400" dirty="0">
+                <a:latin typeface="Trebuchet MS" panose="020B0603020202020204" pitchFamily="34" charset="0"/>
+              </a:rPr>
+              <a:t>Name of student-2</a:t>
+            </a:r>
+          </a:p>
+          <a:p>
+            <a:pPr algn="just"/>
+            <a:r>
+              <a:rPr lang="en-US" sz="2400" dirty="0">
+                <a:latin typeface="Trebuchet MS" panose="020B0603020202020204" pitchFamily="34" charset="0"/>
+              </a:rPr>
+              <a:t>Name of student-3</a:t>
+            </a:r>
+          </a:p>
+          <a:p>
+            <a:pPr algn="just"/>
+            <a:r>
+              <a:rPr lang="en-US" sz="2400" dirty="0">
+                <a:latin typeface="Trebuchet MS" panose="020B0603020202020204" pitchFamily="34" charset="0"/>
+              </a:rPr>
+              <a:t>Name of student-4</a:t>
+            </a:r>
+            <a:endParaRPr lang="en-IN" sz="2400" dirty="0">
+              <a:latin typeface="Trebuchet MS" panose="020B0603020202020204" pitchFamily="34" charset="0"/>
+            </a:endParaRPr>
+          </a:p>
+        </p:txBody>
+      </p:sp>
+      <p:sp>
+        <p:nvSpPr>
+          <p:cNvPr id="4" name="Rectangle 3">
+            <a:extLst>
+              <a:ext uri="{FF2B5EF4-FFF2-40B4-BE49-F238E27FC236}">
+                <a16:creationId xmlns:a16="http://schemas.microsoft.com/office/drawing/2014/main" id="{B2CA2278-3693-E2D0-9D5D-F914C1D8A271}"/>
+              </a:ext>
+            </a:extLst>
+          </p:cNvPr>
+          <p:cNvSpPr/>
+          <p:nvPr/>
+        </p:nvSpPr>
+        <p:spPr>
+          <a:xfrm>
+            <a:off x="7140538" y="3089032"/>
+            <a:ext cx="4293815" cy="2037771"/>
+          </a:xfrm>
+          <a:prstGeom prst="rect">
+            <a:avLst/>
+          </a:prstGeom>
+          <a:ln>
+            <a:solidFill>
+              <a:schemeClr val="bg1"/>
+            </a:solidFill>
+          </a:ln>
+        </p:spPr>
+        <p:style>
+          <a:lnRef idx="2">
+            <a:schemeClr val="accent6"/>
+          </a:lnRef>
+          <a:fillRef idx="1">
+            <a:schemeClr val="lt1"/>
+          </a:fillRef>
+          <a:effectRef idx="0">
+            <a:schemeClr val="accent6"/>
+          </a:effectRef>
+          <a:fontRef idx="minor">
+            <a:schemeClr val="dk1"/>
+          </a:fontRef>
+        </p:style>
+        <p:txBody>
+          <a:bodyPr rtlCol="0" anchor="ctr"/>
+          <a:lstStyle/>
+          <a:p>
+            <a:r>
+              <a:rPr lang="en-US" sz="2400" dirty="0">
+                <a:latin typeface="Trebuchet MS" panose="020B0603020202020204" pitchFamily="34" charset="0"/>
+              </a:rPr>
+              <a:t>AKTU Roll Number-1</a:t>
+            </a:r>
+          </a:p>
+          <a:p>
+            <a:r>
+              <a:rPr lang="en-US" sz="2400" dirty="0">
+                <a:latin typeface="Trebuchet MS" panose="020B0603020202020204" pitchFamily="34" charset="0"/>
+              </a:rPr>
+              <a:t>AKTU Roll Number-2</a:t>
+            </a:r>
+          </a:p>
+          <a:p>
+            <a:r>
+              <a:rPr lang="en-US" sz="2400" dirty="0">
+                <a:latin typeface="Trebuchet MS" panose="020B0603020202020204" pitchFamily="34" charset="0"/>
+              </a:rPr>
+              <a:t>AKTU Roll Number-3</a:t>
+            </a:r>
+          </a:p>
+          <a:p>
+            <a:r>
+              <a:rPr lang="en-US" sz="2400" dirty="0">
+                <a:latin typeface="Trebuchet MS" panose="020B0603020202020204" pitchFamily="34" charset="0"/>
+              </a:rPr>
+              <a:t>AKTU Roll Number-4</a:t>
+            </a:r>
+            <a:endParaRPr lang="en-IN" sz="2400" dirty="0">
+              <a:latin typeface="Trebuchet MS" panose="020B0603020202020204" pitchFamily="34" charset="0"/>
+            </a:endParaRPr>
+          </a:p>
+        </p:txBody>
+      </p:sp>
+    </p:spTree>
+    <p:extLst>
+      <p:ext uri="{BB962C8B-B14F-4D97-AF65-F5344CB8AC3E}">
+        <p14:creationId xmlns:p14="http://schemas.microsoft.com/office/powerpoint/2010/main" val="983572347"/>
+      </p:ext>
+    </p:extLst>
+  </p:cSld>
+  <p:clrMapOvr>
+    <a:masterClrMapping/>
+  </p:clrMapOvr>
+</p:sld>
+</file>
+
+<file path=ppt/slides/slide10.xml><?xml version="1.0" encoding="utf-8"?>
+<p:sld xmlns:a="http://schemas.openxmlformats.org/drawingml/2006/main" xmlns:r="http://schemas.openxmlformats.org/officeDocument/2006/relationships" xmlns:p="http://schemas.openxmlformats.org/presentationml/2006/main">
+  <p:cSld>
+    <p:spTree>
+      <p:nvGrpSpPr>
+        <p:cNvPr id="1" name="">
+          <a:extLst>
+            <a:ext uri="{FF2B5EF4-FFF2-40B4-BE49-F238E27FC236}">
+              <a16:creationId xmlns:a16="http://schemas.microsoft.com/office/drawing/2014/main" id="{60D415D0-33A7-F83F-328D-5D5E931E072A}"/>
+            </a:ext>
+          </a:extLst>
+        </p:cNvPr>
+        <p:cNvGrpSpPr/>
+        <p:nvPr/>
+      </p:nvGrpSpPr>
+      <p:grpSpPr>
+        <a:xfrm>
+          <a:off x="0" y="0"/>
+          <a:ext cx="0" cy="0"/>
+          <a:chOff x="0" y="0"/>
+          <a:chExt cx="0" cy="0"/>
+        </a:xfrm>
+      </p:grpSpPr>
+      <p:sp>
+        <p:nvSpPr>
+          <p:cNvPr id="15" name="Title 1">
+            <a:extLst>
+              <a:ext uri="{FF2B5EF4-FFF2-40B4-BE49-F238E27FC236}">
+                <a16:creationId xmlns:a16="http://schemas.microsoft.com/office/drawing/2014/main" id="{92B2B5E6-4C45-2948-ABFF-53A3989C25CC}"/>
+              </a:ext>
+            </a:extLst>
+          </p:cNvPr>
+          <p:cNvSpPr txBox="1">
+            <a:spLocks/>
+          </p:cNvSpPr>
+          <p:nvPr/>
+        </p:nvSpPr>
+        <p:spPr>
+          <a:xfrm>
+            <a:off x="691718" y="2034284"/>
+            <a:ext cx="10515600" cy="3914453"/>
+          </a:xfrm>
+          <a:prstGeom prst="rect">
+            <a:avLst/>
+          </a:prstGeom>
+        </p:spPr>
+        <p:txBody>
+          <a:bodyPr vert="horz" lIns="91440" tIns="45720" rIns="91440" bIns="45720" rtlCol="0" anchor="ctr">
+            <a:normAutofit/>
+          </a:bodyPr>
+          <a:lstStyle>
+            <a:lvl1pPr algn="l" defTabSz="914400" rtl="0" eaLnBrk="1" latinLnBrk="0" hangingPunct="1">
+              <a:lnSpc>
+                <a:spcPct val="90000"/>
+              </a:lnSpc>
+              <a:spcBef>
+                <a:spcPct val="0"/>
+              </a:spcBef>
+              <a:buNone/>
+              <a:defRPr sz="4400" kern="1200">
+                <a:solidFill>
+                  <a:schemeClr val="tx1"/>
+                </a:solidFill>
+                <a:latin typeface="+mj-lt"/>
+                <a:ea typeface="+mj-ea"/>
+                <a:cs typeface="+mj-cs"/>
+              </a:defRPr>
+            </a:lvl1pPr>
+          </a:lstStyle>
+          <a:p>
+            <a:r>
+              <a:rPr lang="en-IN" dirty="0"/>
+              <a:t>			</a:t>
+            </a:r>
+          </a:p>
+        </p:txBody>
+      </p:sp>
+      <p:sp>
+        <p:nvSpPr>
+          <p:cNvPr id="18" name="Title 17">
+            <a:extLst>
+              <a:ext uri="{FF2B5EF4-FFF2-40B4-BE49-F238E27FC236}">
+                <a16:creationId xmlns:a16="http://schemas.microsoft.com/office/drawing/2014/main" id="{CC894896-8B14-BD5D-5CC3-7466E81604C9}"/>
+              </a:ext>
+            </a:extLst>
+          </p:cNvPr>
+          <p:cNvSpPr>
+            <a:spLocks noGrp="1"/>
+          </p:cNvSpPr>
+          <p:nvPr>
+            <p:ph type="title"/>
+          </p:nvPr>
+        </p:nvSpPr>
+        <p:spPr>
+          <a:xfrm>
+            <a:off x="838200" y="1202075"/>
+            <a:ext cx="10515600" cy="595509"/>
+          </a:xfrm>
+        </p:spPr>
+        <p:txBody>
+          <a:bodyPr>
+            <a:normAutofit fontScale="90000"/>
+          </a:bodyPr>
+          <a:lstStyle/>
+          <a:p>
+            <a:pPr algn="ctr"/>
+            <a:r>
+              <a:rPr lang="en-US" dirty="0">
+                <a:latin typeface="Trebuchet MS" panose="020B0603020202020204" pitchFamily="34" charset="0"/>
+              </a:rPr>
+              <a:t>Conclusion</a:t>
+            </a:r>
+            <a:endParaRPr lang="en-IN" dirty="0">
+              <a:latin typeface="Trebuchet MS" panose="020B0603020202020204" pitchFamily="34" charset="0"/>
+            </a:endParaRPr>
+          </a:p>
+        </p:txBody>
+      </p:sp>
+      <p:sp>
+        <p:nvSpPr>
+          <p:cNvPr id="19" name="Content Placeholder 18">
+            <a:extLst>
+              <a:ext uri="{FF2B5EF4-FFF2-40B4-BE49-F238E27FC236}">
+                <a16:creationId xmlns:a16="http://schemas.microsoft.com/office/drawing/2014/main" id="{2D44ED72-9249-8190-D90B-3F52B81C253B}"/>
+              </a:ext>
+            </a:extLst>
+          </p:cNvPr>
+          <p:cNvSpPr>
+            <a:spLocks noGrp="1"/>
+          </p:cNvSpPr>
+          <p:nvPr>
+            <p:ph idx="1"/>
+          </p:nvPr>
+        </p:nvSpPr>
+        <p:spPr>
+          <a:xfrm>
+            <a:off x="838200" y="1893677"/>
+            <a:ext cx="10515600" cy="4491945"/>
+          </a:xfrm>
+        </p:spPr>
+        <p:txBody>
+          <a:bodyPr>
+            <a:normAutofit/>
+          </a:bodyPr>
+          <a:lstStyle/>
+          <a:p>
+            <a:endParaRPr lang="en-IN" sz="1800" dirty="0">
+              <a:latin typeface="Trebuchet MS" panose="020B0603020202020204" pitchFamily="34" charset="0"/>
+            </a:endParaRPr>
+          </a:p>
+        </p:txBody>
+      </p:sp>
+      <p:pic>
+        <p:nvPicPr>
+          <p:cNvPr id="20" name="Content Placeholder 4">
+            <a:extLst>
+              <a:ext uri="{FF2B5EF4-FFF2-40B4-BE49-F238E27FC236}">
+                <a16:creationId xmlns:a16="http://schemas.microsoft.com/office/drawing/2014/main" id="{B6AA7AE2-0938-ED22-79D8-B3EE2C6DDC37}"/>
+              </a:ext>
+            </a:extLst>
+          </p:cNvPr>
+          <p:cNvPicPr>
+            <a:picLocks noChangeAspect="1"/>
+          </p:cNvPicPr>
+          <p:nvPr/>
+        </p:nvPicPr>
+        <p:blipFill>
+          <a:blip r:embed="rId2">
+            <a:extLst>
+              <a:ext uri="{28A0092B-C50C-407E-A947-70E740481C1C}">
+                <a14:useLocalDpi xmlns:a14="http://schemas.microsoft.com/office/drawing/2010/main" val="0"/>
+              </a:ext>
+            </a:extLst>
+          </a:blip>
+          <a:stretch>
+            <a:fillRect/>
+          </a:stretch>
+        </p:blipFill>
+        <p:spPr>
+          <a:xfrm>
+            <a:off x="288234" y="296621"/>
+            <a:ext cx="2290579" cy="736578"/>
+          </a:xfrm>
+          <a:prstGeom prst="rect">
+            <a:avLst/>
+          </a:prstGeom>
+        </p:spPr>
+      </p:pic>
+      <p:pic>
+        <p:nvPicPr>
+          <p:cNvPr id="21" name="Picture 20">
+            <a:extLst>
+              <a:ext uri="{FF2B5EF4-FFF2-40B4-BE49-F238E27FC236}">
+                <a16:creationId xmlns:a16="http://schemas.microsoft.com/office/drawing/2014/main" id="{08E421C3-0F4E-7318-D93A-4D2F8364B828}"/>
+              </a:ext>
+            </a:extLst>
+          </p:cNvPr>
+          <p:cNvPicPr>
+            <a:picLocks noChangeAspect="1"/>
+          </p:cNvPicPr>
+          <p:nvPr/>
+        </p:nvPicPr>
+        <p:blipFill>
+          <a:blip r:embed="rId3">
+            <a:extLst>
+              <a:ext uri="{28A0092B-C50C-407E-A947-70E740481C1C}">
+                <a14:useLocalDpi xmlns:a14="http://schemas.microsoft.com/office/drawing/2010/main" val="0"/>
+              </a:ext>
+            </a:extLst>
+          </a:blip>
+          <a:stretch>
+            <a:fillRect/>
+          </a:stretch>
+        </p:blipFill>
+        <p:spPr>
+          <a:xfrm>
+            <a:off x="10777591" y="140651"/>
+            <a:ext cx="1368026" cy="884123"/>
+          </a:xfrm>
+          <a:prstGeom prst="rect">
+            <a:avLst/>
+          </a:prstGeom>
+        </p:spPr>
+      </p:pic>
+      <p:cxnSp>
+        <p:nvCxnSpPr>
+          <p:cNvPr id="22" name="Straight Connector 21">
+            <a:extLst>
+              <a:ext uri="{FF2B5EF4-FFF2-40B4-BE49-F238E27FC236}">
+                <a16:creationId xmlns:a16="http://schemas.microsoft.com/office/drawing/2014/main" id="{4D353B70-5CA6-7940-BBBC-F7069B3ABEB6}"/>
+              </a:ext>
+            </a:extLst>
+          </p:cNvPr>
+          <p:cNvCxnSpPr/>
+          <p:nvPr/>
+        </p:nvCxnSpPr>
+        <p:spPr>
+          <a:xfrm>
+            <a:off x="0" y="1105981"/>
             <a:ext cx="12145617" cy="0"/>
           </a:xfrm>
           <a:prstGeom prst="line">
@@ -3926,7 +4583,7 @@
     </p:spTree>
     <p:extLst>
       <p:ext uri="{BB962C8B-B14F-4D97-AF65-F5344CB8AC3E}">
-        <p14:creationId xmlns:p14="http://schemas.microsoft.com/office/powerpoint/2010/main" val="983572347"/>
+        <p14:creationId xmlns:p14="http://schemas.microsoft.com/office/powerpoint/2010/main" val="1080808288"/>
       </p:ext>
     </p:extLst>
   </p:cSld>
@@ -3936,12 +4593,18 @@
 </p:sld>
 </file>
 
-<file path=ppt/slides/slide10.xml><?xml version="1.0" encoding="utf-8"?>
+<file path=ppt/slides/slide11.xml><?xml version="1.0" encoding="utf-8"?>
 <p:sld xmlns:a="http://schemas.openxmlformats.org/drawingml/2006/main" xmlns:r="http://schemas.openxmlformats.org/officeDocument/2006/relationships" xmlns:p="http://schemas.openxmlformats.org/presentationml/2006/main">
   <p:cSld>
     <p:spTree>
       <p:nvGrpSpPr>
-        <p:cNvPr id="1" name=""/>
+        <p:cNvPr id="1" name="">
+          <a:extLst>
+            <a:ext uri="{FF2B5EF4-FFF2-40B4-BE49-F238E27FC236}">
+              <a16:creationId xmlns:a16="http://schemas.microsoft.com/office/drawing/2014/main" id="{C330740A-1926-004E-5F53-EC1D463A3987}"/>
+            </a:ext>
+          </a:extLst>
+        </p:cNvPr>
         <p:cNvGrpSpPr/>
         <p:nvPr/>
       </p:nvGrpSpPr>
@@ -3955,10 +4618,105 @@
       </p:grpSpPr>
       <p:sp>
         <p:nvSpPr>
-          <p:cNvPr id="3" name="Content Placeholder 2">
-            <a:extLst>
-              <a:ext uri="{FF2B5EF4-FFF2-40B4-BE49-F238E27FC236}">
-                <a16:creationId xmlns:a16="http://schemas.microsoft.com/office/drawing/2014/main" id="{4103011D-1F2A-D0DA-B292-847649F7E97C}"/>
+          <p:cNvPr id="15" name="Title 1">
+            <a:extLst>
+              <a:ext uri="{FF2B5EF4-FFF2-40B4-BE49-F238E27FC236}">
+                <a16:creationId xmlns:a16="http://schemas.microsoft.com/office/drawing/2014/main" id="{30D6604C-0111-798A-182A-4B4A8088B877}"/>
+              </a:ext>
+            </a:extLst>
+          </p:cNvPr>
+          <p:cNvSpPr txBox="1">
+            <a:spLocks/>
+          </p:cNvSpPr>
+          <p:nvPr/>
+        </p:nvSpPr>
+        <p:spPr>
+          <a:xfrm>
+            <a:off x="691718" y="2034284"/>
+            <a:ext cx="10515600" cy="3914453"/>
+          </a:xfrm>
+          <a:prstGeom prst="rect">
+            <a:avLst/>
+          </a:prstGeom>
+        </p:spPr>
+        <p:txBody>
+          <a:bodyPr vert="horz" lIns="91440" tIns="45720" rIns="91440" bIns="45720" rtlCol="0" anchor="ctr">
+            <a:normAutofit/>
+          </a:bodyPr>
+          <a:lstStyle>
+            <a:lvl1pPr algn="l" defTabSz="914400" rtl="0" eaLnBrk="1" latinLnBrk="0" hangingPunct="1">
+              <a:lnSpc>
+                <a:spcPct val="90000"/>
+              </a:lnSpc>
+              <a:spcBef>
+                <a:spcPct val="0"/>
+              </a:spcBef>
+              <a:buNone/>
+              <a:defRPr sz="4400" kern="1200">
+                <a:solidFill>
+                  <a:schemeClr val="tx1"/>
+                </a:solidFill>
+                <a:latin typeface="+mj-lt"/>
+                <a:ea typeface="+mj-ea"/>
+                <a:cs typeface="+mj-cs"/>
+              </a:defRPr>
+            </a:lvl1pPr>
+          </a:lstStyle>
+          <a:p>
+            <a:r>
+              <a:rPr lang="en-IN" dirty="0"/>
+              <a:t>			</a:t>
+            </a:r>
+          </a:p>
+        </p:txBody>
+      </p:sp>
+      <p:sp>
+        <p:nvSpPr>
+          <p:cNvPr id="18" name="Title 17">
+            <a:extLst>
+              <a:ext uri="{FF2B5EF4-FFF2-40B4-BE49-F238E27FC236}">
+                <a16:creationId xmlns:a16="http://schemas.microsoft.com/office/drawing/2014/main" id="{F0E60A89-A293-BACC-B000-32B562FF46E3}"/>
+              </a:ext>
+            </a:extLst>
+          </p:cNvPr>
+          <p:cNvSpPr>
+            <a:spLocks noGrp="1"/>
+          </p:cNvSpPr>
+          <p:nvPr>
+            <p:ph type="title"/>
+          </p:nvPr>
+        </p:nvSpPr>
+        <p:spPr>
+          <a:xfrm>
+            <a:off x="838200" y="1202075"/>
+            <a:ext cx="10515600" cy="595509"/>
+          </a:xfrm>
+        </p:spPr>
+        <p:txBody>
+          <a:bodyPr>
+            <a:normAutofit fontScale="90000"/>
+          </a:bodyPr>
+          <a:lstStyle/>
+          <a:p>
+            <a:pPr algn="ctr"/>
+            <a:r>
+              <a:rPr lang="en-US" dirty="0">
+                <a:latin typeface="Trebuchet MS" panose="020B0603020202020204" pitchFamily="34" charset="0"/>
+              </a:rPr>
+              <a:t>References</a:t>
+            </a:r>
+            <a:endParaRPr lang="en-IN" dirty="0">
+              <a:latin typeface="Trebuchet MS" panose="020B0603020202020204" pitchFamily="34" charset="0"/>
+            </a:endParaRPr>
+          </a:p>
+        </p:txBody>
+      </p:sp>
+      <p:sp>
+        <p:nvSpPr>
+          <p:cNvPr id="19" name="Content Placeholder 18">
+            <a:extLst>
+              <a:ext uri="{FF2B5EF4-FFF2-40B4-BE49-F238E27FC236}">
+                <a16:creationId xmlns:a16="http://schemas.microsoft.com/office/drawing/2014/main" id="{53F3E7E9-D890-6368-D23D-EC75E5D44CEA}"/>
               </a:ext>
             </a:extLst>
           </p:cNvPr>
@@ -3969,24 +4727,30 @@
             <p:ph idx="1"/>
           </p:nvPr>
         </p:nvSpPr>
-        <p:spPr/>
-        <p:txBody>
-          <a:bodyPr/>
+        <p:spPr>
+          <a:xfrm>
+            <a:off x="838200" y="1893677"/>
+            <a:ext cx="10515600" cy="4491945"/>
+          </a:xfrm>
+        </p:spPr>
+        <p:txBody>
+          <a:bodyPr>
+            <a:normAutofit/>
+          </a:bodyPr>
           <a:lstStyle/>
           <a:p>
-            <a:r>
-              <a:rPr lang="en-IN" dirty="0"/>
-              <a:t>SUMMARY OF RESEARCH PAPERS </a:t>
-            </a:r>
+            <a:endParaRPr lang="en-IN" sz="1800" dirty="0">
+              <a:latin typeface="Trebuchet MS" panose="020B0603020202020204" pitchFamily="34" charset="0"/>
+            </a:endParaRPr>
           </a:p>
         </p:txBody>
       </p:sp>
       <p:pic>
         <p:nvPicPr>
-          <p:cNvPr id="4" name="Content Placeholder 4">
-            <a:extLst>
-              <a:ext uri="{FF2B5EF4-FFF2-40B4-BE49-F238E27FC236}">
-                <a16:creationId xmlns:a16="http://schemas.microsoft.com/office/drawing/2014/main" id="{FA2A1864-7EAB-5034-E24F-CBAF62934A2D}"/>
+          <p:cNvPr id="20" name="Content Placeholder 4">
+            <a:extLst>
+              <a:ext uri="{FF2B5EF4-FFF2-40B4-BE49-F238E27FC236}">
+                <a16:creationId xmlns:a16="http://schemas.microsoft.com/office/drawing/2014/main" id="{F82CFBCD-7126-3AE3-561D-39FAD29A78B1}"/>
               </a:ext>
             </a:extLst>
           </p:cNvPr>
@@ -4009,8 +4773,8 @@
         </p:blipFill>
         <p:spPr>
           <a:xfrm>
-            <a:off x="288234" y="296620"/>
-            <a:ext cx="3643313" cy="1171575"/>
+            <a:off x="288234" y="296621"/>
+            <a:ext cx="2290579" cy="736578"/>
           </a:xfrm>
           <a:prstGeom prst="rect">
             <a:avLst/>
@@ -4019,10 +4783,10 @@
       </p:pic>
       <p:pic>
         <p:nvPicPr>
-          <p:cNvPr id="5" name="Picture 4">
-            <a:extLst>
-              <a:ext uri="{FF2B5EF4-FFF2-40B4-BE49-F238E27FC236}">
-                <a16:creationId xmlns:a16="http://schemas.microsoft.com/office/drawing/2014/main" id="{0EE15DBF-C36B-2538-10BD-C652ACBF2CA1}"/>
+          <p:cNvPr id="21" name="Picture 20">
+            <a:extLst>
+              <a:ext uri="{FF2B5EF4-FFF2-40B4-BE49-F238E27FC236}">
+                <a16:creationId xmlns:a16="http://schemas.microsoft.com/office/drawing/2014/main" id="{1EC357A8-5422-9E9E-6C0A-8206D4E0F922}"/>
               </a:ext>
             </a:extLst>
           </p:cNvPr>
@@ -4045,8 +4809,8 @@
         </p:blipFill>
         <p:spPr>
           <a:xfrm>
-            <a:off x="9488142" y="58459"/>
-            <a:ext cx="2657475" cy="1468439"/>
+            <a:off x="10777591" y="140651"/>
+            <a:ext cx="1368026" cy="884123"/>
           </a:xfrm>
           <a:prstGeom prst="rect">
             <a:avLst/>
@@ -4055,10 +4819,10 @@
       </p:pic>
       <p:cxnSp>
         <p:nvCxnSpPr>
-          <p:cNvPr id="6" name="Straight Connector 5">
-            <a:extLst>
-              <a:ext uri="{FF2B5EF4-FFF2-40B4-BE49-F238E27FC236}">
-                <a16:creationId xmlns:a16="http://schemas.microsoft.com/office/drawing/2014/main" id="{74335D6B-0262-98F5-5DE5-8BF53EE73D93}"/>
+          <p:cNvPr id="22" name="Straight Connector 21">
+            <a:extLst>
+              <a:ext uri="{FF2B5EF4-FFF2-40B4-BE49-F238E27FC236}">
+                <a16:creationId xmlns:a16="http://schemas.microsoft.com/office/drawing/2014/main" id="{4F3B6F4C-2D37-AAF2-8965-565DA634178C}"/>
               </a:ext>
             </a:extLst>
           </p:cNvPr>
@@ -4067,7 +4831,7 @@
         </p:nvCxnSpPr>
         <p:spPr>
           <a:xfrm>
-            <a:off x="0" y="1648031"/>
+            <a:off x="0" y="1105981"/>
             <a:ext cx="12145617" cy="0"/>
           </a:xfrm>
           <a:prstGeom prst="line">
@@ -4100,7 +4864,7 @@
     </p:spTree>
     <p:extLst>
       <p:ext uri="{BB962C8B-B14F-4D97-AF65-F5344CB8AC3E}">
-        <p14:creationId xmlns:p14="http://schemas.microsoft.com/office/powerpoint/2010/main" val="2459073253"/>
+        <p14:creationId xmlns:p14="http://schemas.microsoft.com/office/powerpoint/2010/main" val="819316471"/>
       </p:ext>
     </p:extLst>
   </p:cSld>
@@ -4110,12 +4874,18 @@
 </p:sld>
 </file>
 
-<file path=ppt/slides/slide11.xml><?xml version="1.0" encoding="utf-8"?>
+<file path=ppt/slides/slide2.xml><?xml version="1.0" encoding="utf-8"?>
 <p:sld xmlns:a="http://schemas.openxmlformats.org/drawingml/2006/main" xmlns:r="http://schemas.openxmlformats.org/officeDocument/2006/relationships" xmlns:p="http://schemas.openxmlformats.org/presentationml/2006/main">
   <p:cSld>
     <p:spTree>
       <p:nvGrpSpPr>
-        <p:cNvPr id="1" name=""/>
+        <p:cNvPr id="1" name="">
+          <a:extLst>
+            <a:ext uri="{FF2B5EF4-FFF2-40B4-BE49-F238E27FC236}">
+              <a16:creationId xmlns:a16="http://schemas.microsoft.com/office/drawing/2014/main" id="{0C08395E-D611-AA84-9603-DC0ABB701CCE}"/>
+            </a:ext>
+          </a:extLst>
+        </p:cNvPr>
         <p:cNvGrpSpPr/>
         <p:nvPr/>
       </p:nvGrpSpPr>
@@ -4129,10 +4899,105 @@
       </p:grpSpPr>
       <p:sp>
         <p:nvSpPr>
-          <p:cNvPr id="3" name="Content Placeholder 2">
-            <a:extLst>
-              <a:ext uri="{FF2B5EF4-FFF2-40B4-BE49-F238E27FC236}">
-                <a16:creationId xmlns:a16="http://schemas.microsoft.com/office/drawing/2014/main" id="{03C8706C-B1AC-6C36-FBBB-0EEF4744481A}"/>
+          <p:cNvPr id="15" name="Title 1">
+            <a:extLst>
+              <a:ext uri="{FF2B5EF4-FFF2-40B4-BE49-F238E27FC236}">
+                <a16:creationId xmlns:a16="http://schemas.microsoft.com/office/drawing/2014/main" id="{8ADB9452-4841-5900-0A13-8D4F4692FC8F}"/>
+              </a:ext>
+            </a:extLst>
+          </p:cNvPr>
+          <p:cNvSpPr txBox="1">
+            <a:spLocks/>
+          </p:cNvSpPr>
+          <p:nvPr/>
+        </p:nvSpPr>
+        <p:spPr>
+          <a:xfrm>
+            <a:off x="691718" y="2034284"/>
+            <a:ext cx="10515600" cy="3914453"/>
+          </a:xfrm>
+          <a:prstGeom prst="rect">
+            <a:avLst/>
+          </a:prstGeom>
+        </p:spPr>
+        <p:txBody>
+          <a:bodyPr vert="horz" lIns="91440" tIns="45720" rIns="91440" bIns="45720" rtlCol="0" anchor="ctr">
+            <a:normAutofit/>
+          </a:bodyPr>
+          <a:lstStyle>
+            <a:lvl1pPr algn="l" defTabSz="914400" rtl="0" eaLnBrk="1" latinLnBrk="0" hangingPunct="1">
+              <a:lnSpc>
+                <a:spcPct val="90000"/>
+              </a:lnSpc>
+              <a:spcBef>
+                <a:spcPct val="0"/>
+              </a:spcBef>
+              <a:buNone/>
+              <a:defRPr sz="4400" kern="1200">
+                <a:solidFill>
+                  <a:schemeClr val="tx1"/>
+                </a:solidFill>
+                <a:latin typeface="+mj-lt"/>
+                <a:ea typeface="+mj-ea"/>
+                <a:cs typeface="+mj-cs"/>
+              </a:defRPr>
+            </a:lvl1pPr>
+          </a:lstStyle>
+          <a:p>
+            <a:r>
+              <a:rPr lang="en-IN" dirty="0"/>
+              <a:t>			</a:t>
+            </a:r>
+          </a:p>
+        </p:txBody>
+      </p:sp>
+      <p:sp>
+        <p:nvSpPr>
+          <p:cNvPr id="18" name="Title 17">
+            <a:extLst>
+              <a:ext uri="{FF2B5EF4-FFF2-40B4-BE49-F238E27FC236}">
+                <a16:creationId xmlns:a16="http://schemas.microsoft.com/office/drawing/2014/main" id="{DF0CF307-3F72-574E-8244-07B1DE4FD88F}"/>
+              </a:ext>
+            </a:extLst>
+          </p:cNvPr>
+          <p:cNvSpPr>
+            <a:spLocks noGrp="1"/>
+          </p:cNvSpPr>
+          <p:nvPr>
+            <p:ph type="title"/>
+          </p:nvPr>
+        </p:nvSpPr>
+        <p:spPr>
+          <a:xfrm>
+            <a:off x="838200" y="1202075"/>
+            <a:ext cx="10515600" cy="595509"/>
+          </a:xfrm>
+        </p:spPr>
+        <p:txBody>
+          <a:bodyPr>
+            <a:normAutofit fontScale="90000"/>
+          </a:bodyPr>
+          <a:lstStyle/>
+          <a:p>
+            <a:pPr algn="ctr"/>
+            <a:r>
+              <a:rPr lang="en-US" dirty="0">
+                <a:latin typeface="Trebuchet MS" panose="020B0603020202020204" pitchFamily="34" charset="0"/>
+              </a:rPr>
+              <a:t>Outline</a:t>
+            </a:r>
+            <a:endParaRPr lang="en-IN" dirty="0">
+              <a:latin typeface="Trebuchet MS" panose="020B0603020202020204" pitchFamily="34" charset="0"/>
+            </a:endParaRPr>
+          </a:p>
+        </p:txBody>
+      </p:sp>
+      <p:sp>
+        <p:nvSpPr>
+          <p:cNvPr id="19" name="Content Placeholder 18">
+            <a:extLst>
+              <a:ext uri="{FF2B5EF4-FFF2-40B4-BE49-F238E27FC236}">
+                <a16:creationId xmlns:a16="http://schemas.microsoft.com/office/drawing/2014/main" id="{9A7C4B76-F98F-9764-43EB-3E3BF4F8EDC6}"/>
               </a:ext>
             </a:extLst>
           </p:cNvPr>
@@ -4143,39 +5008,30 @@
             <p:ph idx="1"/>
           </p:nvPr>
         </p:nvSpPr>
-        <p:spPr/>
-        <p:txBody>
-          <a:bodyPr/>
+        <p:spPr>
+          <a:xfrm>
+            <a:off x="838200" y="1893677"/>
+            <a:ext cx="10515600" cy="4491945"/>
+          </a:xfrm>
+        </p:spPr>
+        <p:txBody>
+          <a:bodyPr>
+            <a:normAutofit/>
+          </a:bodyPr>
           <a:lstStyle/>
           <a:p>
-            <a:pPr marL="0" indent="0">
-              <a:buNone/>
-            </a:pPr>
-            <a:endParaRPr lang="en-IN" dirty="0"/>
-          </a:p>
-          <a:p>
-            <a:pPr marL="0" indent="0">
-              <a:buNone/>
-            </a:pPr>
-            <a:endParaRPr lang="en-IN" sz="5400" b="1" dirty="0"/>
-          </a:p>
-          <a:p>
-            <a:pPr marL="0" indent="0" algn="ctr">
-              <a:buNone/>
-            </a:pPr>
-            <a:r>
-              <a:rPr lang="en-IN" sz="5400" b="1" dirty="0"/>
-              <a:t>THANK YOU </a:t>
-            </a:r>
+            <a:endParaRPr lang="en-IN" sz="1800" dirty="0">
+              <a:latin typeface="Trebuchet MS" panose="020B0603020202020204" pitchFamily="34" charset="0"/>
+            </a:endParaRPr>
           </a:p>
         </p:txBody>
       </p:sp>
       <p:pic>
         <p:nvPicPr>
-          <p:cNvPr id="4" name="Content Placeholder 4">
-            <a:extLst>
-              <a:ext uri="{FF2B5EF4-FFF2-40B4-BE49-F238E27FC236}">
-                <a16:creationId xmlns:a16="http://schemas.microsoft.com/office/drawing/2014/main" id="{FE07EEFD-85CD-6BB7-7C49-7C35CEA569FF}"/>
+          <p:cNvPr id="20" name="Content Placeholder 4">
+            <a:extLst>
+              <a:ext uri="{FF2B5EF4-FFF2-40B4-BE49-F238E27FC236}">
+                <a16:creationId xmlns:a16="http://schemas.microsoft.com/office/drawing/2014/main" id="{93AFAF28-1497-1B30-B572-F6CBEF41A104}"/>
               </a:ext>
             </a:extLst>
           </p:cNvPr>
@@ -4198,8 +5054,8 @@
         </p:blipFill>
         <p:spPr>
           <a:xfrm>
-            <a:off x="288234" y="296620"/>
-            <a:ext cx="3643313" cy="1171575"/>
+            <a:off x="288234" y="296621"/>
+            <a:ext cx="2290579" cy="736578"/>
           </a:xfrm>
           <a:prstGeom prst="rect">
             <a:avLst/>
@@ -4208,10 +5064,10 @@
       </p:pic>
       <p:pic>
         <p:nvPicPr>
-          <p:cNvPr id="5" name="Picture 4">
-            <a:extLst>
-              <a:ext uri="{FF2B5EF4-FFF2-40B4-BE49-F238E27FC236}">
-                <a16:creationId xmlns:a16="http://schemas.microsoft.com/office/drawing/2014/main" id="{D83779B6-3069-2476-FBEB-90181F9BA07A}"/>
+          <p:cNvPr id="21" name="Picture 20">
+            <a:extLst>
+              <a:ext uri="{FF2B5EF4-FFF2-40B4-BE49-F238E27FC236}">
+                <a16:creationId xmlns:a16="http://schemas.microsoft.com/office/drawing/2014/main" id="{680152F6-A079-342A-72A9-9C63EE555CA2}"/>
               </a:ext>
             </a:extLst>
           </p:cNvPr>
@@ -4234,8 +5090,8 @@
         </p:blipFill>
         <p:spPr>
           <a:xfrm>
-            <a:off x="9488142" y="58459"/>
-            <a:ext cx="2657475" cy="1468439"/>
+            <a:off x="10777591" y="140651"/>
+            <a:ext cx="1368026" cy="884123"/>
           </a:xfrm>
           <a:prstGeom prst="rect">
             <a:avLst/>
@@ -4244,10 +5100,10 @@
       </p:pic>
       <p:cxnSp>
         <p:nvCxnSpPr>
-          <p:cNvPr id="6" name="Straight Connector 5">
-            <a:extLst>
-              <a:ext uri="{FF2B5EF4-FFF2-40B4-BE49-F238E27FC236}">
-                <a16:creationId xmlns:a16="http://schemas.microsoft.com/office/drawing/2014/main" id="{7DB90D1F-DAEE-B38A-39CC-71652D773975}"/>
+          <p:cNvPr id="22" name="Straight Connector 21">
+            <a:extLst>
+              <a:ext uri="{FF2B5EF4-FFF2-40B4-BE49-F238E27FC236}">
+                <a16:creationId xmlns:a16="http://schemas.microsoft.com/office/drawing/2014/main" id="{0B8C9FF8-75AE-FC60-0ACA-B8FAFC66720B}"/>
               </a:ext>
             </a:extLst>
           </p:cNvPr>
@@ -4256,7 +5112,7 @@
         </p:nvCxnSpPr>
         <p:spPr>
           <a:xfrm>
-            <a:off x="0" y="1648031"/>
+            <a:off x="0" y="1105981"/>
             <a:ext cx="12145617" cy="0"/>
           </a:xfrm>
           <a:prstGeom prst="line">
@@ -4289,7 +5145,7 @@
     </p:spTree>
     <p:extLst>
       <p:ext uri="{BB962C8B-B14F-4D97-AF65-F5344CB8AC3E}">
-        <p14:creationId xmlns:p14="http://schemas.microsoft.com/office/powerpoint/2010/main" val="3440270865"/>
+        <p14:creationId xmlns:p14="http://schemas.microsoft.com/office/powerpoint/2010/main" val="2899402119"/>
       </p:ext>
     </p:extLst>
   </p:cSld>
@@ -4299,12 +5155,18 @@
 </p:sld>
 </file>
 
-<file path=ppt/slides/slide2.xml><?xml version="1.0" encoding="utf-8"?>
+<file path=ppt/slides/slide3.xml><?xml version="1.0" encoding="utf-8"?>
 <p:sld xmlns:a="http://schemas.openxmlformats.org/drawingml/2006/main" xmlns:r="http://schemas.openxmlformats.org/officeDocument/2006/relationships" xmlns:p="http://schemas.openxmlformats.org/presentationml/2006/main">
   <p:cSld>
     <p:spTree>
       <p:nvGrpSpPr>
-        <p:cNvPr id="1" name=""/>
+        <p:cNvPr id="1" name="">
+          <a:extLst>
+            <a:ext uri="{FF2B5EF4-FFF2-40B4-BE49-F238E27FC236}">
+              <a16:creationId xmlns:a16="http://schemas.microsoft.com/office/drawing/2014/main" id="{E1047C71-DE9E-8528-C01E-ADC1A46BF007}"/>
+            </a:ext>
+          </a:extLst>
+        </p:cNvPr>
         <p:cNvGrpSpPr/>
         <p:nvPr/>
       </p:nvGrpSpPr>
@@ -4318,10 +5180,105 @@
       </p:grpSpPr>
       <p:sp>
         <p:nvSpPr>
-          <p:cNvPr id="3" name="Content Placeholder 2">
-            <a:extLst>
-              <a:ext uri="{FF2B5EF4-FFF2-40B4-BE49-F238E27FC236}">
-                <a16:creationId xmlns:a16="http://schemas.microsoft.com/office/drawing/2014/main" id="{71650C02-E10E-47B7-3E94-F581E801C6F6}"/>
+          <p:cNvPr id="15" name="Title 1">
+            <a:extLst>
+              <a:ext uri="{FF2B5EF4-FFF2-40B4-BE49-F238E27FC236}">
+                <a16:creationId xmlns:a16="http://schemas.microsoft.com/office/drawing/2014/main" id="{690606DC-41B8-1E10-E67A-B6E250C5242D}"/>
+              </a:ext>
+            </a:extLst>
+          </p:cNvPr>
+          <p:cNvSpPr txBox="1">
+            <a:spLocks/>
+          </p:cNvSpPr>
+          <p:nvPr/>
+        </p:nvSpPr>
+        <p:spPr>
+          <a:xfrm>
+            <a:off x="691718" y="2034284"/>
+            <a:ext cx="10515600" cy="3914453"/>
+          </a:xfrm>
+          <a:prstGeom prst="rect">
+            <a:avLst/>
+          </a:prstGeom>
+        </p:spPr>
+        <p:txBody>
+          <a:bodyPr vert="horz" lIns="91440" tIns="45720" rIns="91440" bIns="45720" rtlCol="0" anchor="ctr">
+            <a:normAutofit/>
+          </a:bodyPr>
+          <a:lstStyle>
+            <a:lvl1pPr algn="l" defTabSz="914400" rtl="0" eaLnBrk="1" latinLnBrk="0" hangingPunct="1">
+              <a:lnSpc>
+                <a:spcPct val="90000"/>
+              </a:lnSpc>
+              <a:spcBef>
+                <a:spcPct val="0"/>
+              </a:spcBef>
+              <a:buNone/>
+              <a:defRPr sz="4400" kern="1200">
+                <a:solidFill>
+                  <a:schemeClr val="tx1"/>
+                </a:solidFill>
+                <a:latin typeface="+mj-lt"/>
+                <a:ea typeface="+mj-ea"/>
+                <a:cs typeface="+mj-cs"/>
+              </a:defRPr>
+            </a:lvl1pPr>
+          </a:lstStyle>
+          <a:p>
+            <a:r>
+              <a:rPr lang="en-IN" dirty="0"/>
+              <a:t>			</a:t>
+            </a:r>
+          </a:p>
+        </p:txBody>
+      </p:sp>
+      <p:sp>
+        <p:nvSpPr>
+          <p:cNvPr id="18" name="Title 17">
+            <a:extLst>
+              <a:ext uri="{FF2B5EF4-FFF2-40B4-BE49-F238E27FC236}">
+                <a16:creationId xmlns:a16="http://schemas.microsoft.com/office/drawing/2014/main" id="{EEE97636-D936-7382-0E0D-A61B610174DA}"/>
+              </a:ext>
+            </a:extLst>
+          </p:cNvPr>
+          <p:cNvSpPr>
+            <a:spLocks noGrp="1"/>
+          </p:cNvSpPr>
+          <p:nvPr>
+            <p:ph type="title"/>
+          </p:nvPr>
+        </p:nvSpPr>
+        <p:spPr>
+          <a:xfrm>
+            <a:off x="838200" y="1202075"/>
+            <a:ext cx="10515600" cy="595509"/>
+          </a:xfrm>
+        </p:spPr>
+        <p:txBody>
+          <a:bodyPr>
+            <a:normAutofit fontScale="90000"/>
+          </a:bodyPr>
+          <a:lstStyle/>
+          <a:p>
+            <a:pPr algn="ctr"/>
+            <a:r>
+              <a:rPr lang="en-US" dirty="0">
+                <a:latin typeface="Trebuchet MS" panose="020B0603020202020204" pitchFamily="34" charset="0"/>
+              </a:rPr>
+              <a:t>Introduction</a:t>
+            </a:r>
+            <a:endParaRPr lang="en-IN" dirty="0">
+              <a:latin typeface="Trebuchet MS" panose="020B0603020202020204" pitchFamily="34" charset="0"/>
+            </a:endParaRPr>
+          </a:p>
+        </p:txBody>
+      </p:sp>
+      <p:sp>
+        <p:nvSpPr>
+          <p:cNvPr id="19" name="Content Placeholder 18">
+            <a:extLst>
+              <a:ext uri="{FF2B5EF4-FFF2-40B4-BE49-F238E27FC236}">
+                <a16:creationId xmlns:a16="http://schemas.microsoft.com/office/drawing/2014/main" id="{CA456588-EAF7-F166-DA41-437D69FDED2B}"/>
               </a:ext>
             </a:extLst>
           </p:cNvPr>
@@ -4332,24 +5289,30 @@
             <p:ph idx="1"/>
           </p:nvPr>
         </p:nvSpPr>
-        <p:spPr/>
-        <p:txBody>
-          <a:bodyPr/>
+        <p:spPr>
+          <a:xfrm>
+            <a:off x="838200" y="1893677"/>
+            <a:ext cx="10515600" cy="4491945"/>
+          </a:xfrm>
+        </p:spPr>
+        <p:txBody>
+          <a:bodyPr>
+            <a:normAutofit/>
+          </a:bodyPr>
           <a:lstStyle/>
           <a:p>
-            <a:r>
-              <a:rPr lang="en-IN" dirty="0"/>
-              <a:t>OUTLINE</a:t>
-            </a:r>
+            <a:endParaRPr lang="en-IN" sz="1800" dirty="0">
+              <a:latin typeface="Trebuchet MS" panose="020B0603020202020204" pitchFamily="34" charset="0"/>
+            </a:endParaRPr>
           </a:p>
         </p:txBody>
       </p:sp>
       <p:pic>
         <p:nvPicPr>
-          <p:cNvPr id="4" name="Content Placeholder 4">
-            <a:extLst>
-              <a:ext uri="{FF2B5EF4-FFF2-40B4-BE49-F238E27FC236}">
-                <a16:creationId xmlns:a16="http://schemas.microsoft.com/office/drawing/2014/main" id="{A1E4B8C7-9126-8D01-EBD6-634EA81D190D}"/>
+          <p:cNvPr id="20" name="Content Placeholder 4">
+            <a:extLst>
+              <a:ext uri="{FF2B5EF4-FFF2-40B4-BE49-F238E27FC236}">
+                <a16:creationId xmlns:a16="http://schemas.microsoft.com/office/drawing/2014/main" id="{A376CD85-B5AF-EEF0-EED3-DA579B988ED2}"/>
               </a:ext>
             </a:extLst>
           </p:cNvPr>
@@ -4372,8 +5335,8 @@
         </p:blipFill>
         <p:spPr>
           <a:xfrm>
-            <a:off x="288234" y="296620"/>
-            <a:ext cx="3643313" cy="1171575"/>
+            <a:off x="288234" y="296621"/>
+            <a:ext cx="2290579" cy="736578"/>
           </a:xfrm>
           <a:prstGeom prst="rect">
             <a:avLst/>
@@ -4382,10 +5345,10 @@
       </p:pic>
       <p:pic>
         <p:nvPicPr>
-          <p:cNvPr id="5" name="Picture 4">
-            <a:extLst>
-              <a:ext uri="{FF2B5EF4-FFF2-40B4-BE49-F238E27FC236}">
-                <a16:creationId xmlns:a16="http://schemas.microsoft.com/office/drawing/2014/main" id="{C12E77A7-EAA0-D6D2-9ED2-A769258BBC6C}"/>
+          <p:cNvPr id="21" name="Picture 20">
+            <a:extLst>
+              <a:ext uri="{FF2B5EF4-FFF2-40B4-BE49-F238E27FC236}">
+                <a16:creationId xmlns:a16="http://schemas.microsoft.com/office/drawing/2014/main" id="{6B048C48-19D0-B154-6352-AF0418FCFCD6}"/>
               </a:ext>
             </a:extLst>
           </p:cNvPr>
@@ -4408,8 +5371,8 @@
         </p:blipFill>
         <p:spPr>
           <a:xfrm>
-            <a:off x="9488142" y="58459"/>
-            <a:ext cx="2657475" cy="1468439"/>
+            <a:off x="10777591" y="140651"/>
+            <a:ext cx="1368026" cy="884123"/>
           </a:xfrm>
           <a:prstGeom prst="rect">
             <a:avLst/>
@@ -4418,10 +5381,10 @@
       </p:pic>
       <p:cxnSp>
         <p:nvCxnSpPr>
-          <p:cNvPr id="6" name="Straight Connector 5">
-            <a:extLst>
-              <a:ext uri="{FF2B5EF4-FFF2-40B4-BE49-F238E27FC236}">
-                <a16:creationId xmlns:a16="http://schemas.microsoft.com/office/drawing/2014/main" id="{5945612A-B44A-B020-F088-8A96A4C0872E}"/>
+          <p:cNvPr id="22" name="Straight Connector 21">
+            <a:extLst>
+              <a:ext uri="{FF2B5EF4-FFF2-40B4-BE49-F238E27FC236}">
+                <a16:creationId xmlns:a16="http://schemas.microsoft.com/office/drawing/2014/main" id="{45C6D13B-7E07-8C37-D1B0-F323D060342D}"/>
               </a:ext>
             </a:extLst>
           </p:cNvPr>
@@ -4430,7 +5393,7 @@
         </p:nvCxnSpPr>
         <p:spPr>
           <a:xfrm>
-            <a:off x="0" y="1648031"/>
+            <a:off x="0" y="1105981"/>
             <a:ext cx="12145617" cy="0"/>
           </a:xfrm>
           <a:prstGeom prst="line">
@@ -4463,7 +5426,7 @@
     </p:spTree>
     <p:extLst>
       <p:ext uri="{BB962C8B-B14F-4D97-AF65-F5344CB8AC3E}">
-        <p14:creationId xmlns:p14="http://schemas.microsoft.com/office/powerpoint/2010/main" val="934052922"/>
+        <p14:creationId xmlns:p14="http://schemas.microsoft.com/office/powerpoint/2010/main" val="1451485208"/>
       </p:ext>
     </p:extLst>
   </p:cSld>
@@ -4473,12 +5436,18 @@
 </p:sld>
 </file>
 
-<file path=ppt/slides/slide3.xml><?xml version="1.0" encoding="utf-8"?>
+<file path=ppt/slides/slide4.xml><?xml version="1.0" encoding="utf-8"?>
 <p:sld xmlns:a="http://schemas.openxmlformats.org/drawingml/2006/main" xmlns:r="http://schemas.openxmlformats.org/officeDocument/2006/relationships" xmlns:p="http://schemas.openxmlformats.org/presentationml/2006/main">
   <p:cSld>
     <p:spTree>
       <p:nvGrpSpPr>
-        <p:cNvPr id="1" name=""/>
+        <p:cNvPr id="1" name="">
+          <a:extLst>
+            <a:ext uri="{FF2B5EF4-FFF2-40B4-BE49-F238E27FC236}">
+              <a16:creationId xmlns:a16="http://schemas.microsoft.com/office/drawing/2014/main" id="{7D0BDF9C-84FC-7749-B01D-2F2D9E8A4FCB}"/>
+            </a:ext>
+          </a:extLst>
+        </p:cNvPr>
         <p:cNvGrpSpPr/>
         <p:nvPr/>
       </p:nvGrpSpPr>
@@ -4492,10 +5461,105 @@
       </p:grpSpPr>
       <p:sp>
         <p:nvSpPr>
-          <p:cNvPr id="3" name="Content Placeholder 2">
-            <a:extLst>
-              <a:ext uri="{FF2B5EF4-FFF2-40B4-BE49-F238E27FC236}">
-                <a16:creationId xmlns:a16="http://schemas.microsoft.com/office/drawing/2014/main" id="{9417C008-461C-5087-D6DA-6642F32B3D29}"/>
+          <p:cNvPr id="15" name="Title 1">
+            <a:extLst>
+              <a:ext uri="{FF2B5EF4-FFF2-40B4-BE49-F238E27FC236}">
+                <a16:creationId xmlns:a16="http://schemas.microsoft.com/office/drawing/2014/main" id="{3E3DE789-FF44-6F5F-7015-C7478428CB32}"/>
+              </a:ext>
+            </a:extLst>
+          </p:cNvPr>
+          <p:cNvSpPr txBox="1">
+            <a:spLocks/>
+          </p:cNvSpPr>
+          <p:nvPr/>
+        </p:nvSpPr>
+        <p:spPr>
+          <a:xfrm>
+            <a:off x="691718" y="2034284"/>
+            <a:ext cx="10515600" cy="3914453"/>
+          </a:xfrm>
+          <a:prstGeom prst="rect">
+            <a:avLst/>
+          </a:prstGeom>
+        </p:spPr>
+        <p:txBody>
+          <a:bodyPr vert="horz" lIns="91440" tIns="45720" rIns="91440" bIns="45720" rtlCol="0" anchor="ctr">
+            <a:normAutofit/>
+          </a:bodyPr>
+          <a:lstStyle>
+            <a:lvl1pPr algn="l" defTabSz="914400" rtl="0" eaLnBrk="1" latinLnBrk="0" hangingPunct="1">
+              <a:lnSpc>
+                <a:spcPct val="90000"/>
+              </a:lnSpc>
+              <a:spcBef>
+                <a:spcPct val="0"/>
+              </a:spcBef>
+              <a:buNone/>
+              <a:defRPr sz="4400" kern="1200">
+                <a:solidFill>
+                  <a:schemeClr val="tx1"/>
+                </a:solidFill>
+                <a:latin typeface="+mj-lt"/>
+                <a:ea typeface="+mj-ea"/>
+                <a:cs typeface="+mj-cs"/>
+              </a:defRPr>
+            </a:lvl1pPr>
+          </a:lstStyle>
+          <a:p>
+            <a:r>
+              <a:rPr lang="en-IN" dirty="0"/>
+              <a:t>			</a:t>
+            </a:r>
+          </a:p>
+        </p:txBody>
+      </p:sp>
+      <p:sp>
+        <p:nvSpPr>
+          <p:cNvPr id="18" name="Title 17">
+            <a:extLst>
+              <a:ext uri="{FF2B5EF4-FFF2-40B4-BE49-F238E27FC236}">
+                <a16:creationId xmlns:a16="http://schemas.microsoft.com/office/drawing/2014/main" id="{EAFBB1A5-D565-31E4-6453-198364F3452C}"/>
+              </a:ext>
+            </a:extLst>
+          </p:cNvPr>
+          <p:cNvSpPr>
+            <a:spLocks noGrp="1"/>
+          </p:cNvSpPr>
+          <p:nvPr>
+            <p:ph type="title"/>
+          </p:nvPr>
+        </p:nvSpPr>
+        <p:spPr>
+          <a:xfrm>
+            <a:off x="838200" y="1202075"/>
+            <a:ext cx="10515600" cy="595509"/>
+          </a:xfrm>
+        </p:spPr>
+        <p:txBody>
+          <a:bodyPr>
+            <a:normAutofit fontScale="90000"/>
+          </a:bodyPr>
+          <a:lstStyle/>
+          <a:p>
+            <a:pPr algn="ctr"/>
+            <a:r>
+              <a:rPr lang="en-US" dirty="0">
+                <a:latin typeface="Trebuchet MS" panose="020B0603020202020204" pitchFamily="34" charset="0"/>
+              </a:rPr>
+              <a:t>Objectives</a:t>
+            </a:r>
+            <a:endParaRPr lang="en-IN" dirty="0">
+              <a:latin typeface="Trebuchet MS" panose="020B0603020202020204" pitchFamily="34" charset="0"/>
+            </a:endParaRPr>
+          </a:p>
+        </p:txBody>
+      </p:sp>
+      <p:sp>
+        <p:nvSpPr>
+          <p:cNvPr id="19" name="Content Placeholder 18">
+            <a:extLst>
+              <a:ext uri="{FF2B5EF4-FFF2-40B4-BE49-F238E27FC236}">
+                <a16:creationId xmlns:a16="http://schemas.microsoft.com/office/drawing/2014/main" id="{787C0CD0-8BC4-5A63-12AD-364645758E04}"/>
               </a:ext>
             </a:extLst>
           </p:cNvPr>
@@ -4506,24 +5570,30 @@
             <p:ph idx="1"/>
           </p:nvPr>
         </p:nvSpPr>
-        <p:spPr/>
-        <p:txBody>
-          <a:bodyPr/>
+        <p:spPr>
+          <a:xfrm>
+            <a:off x="838200" y="1893677"/>
+            <a:ext cx="10515600" cy="4491945"/>
+          </a:xfrm>
+        </p:spPr>
+        <p:txBody>
+          <a:bodyPr>
+            <a:normAutofit/>
+          </a:bodyPr>
           <a:lstStyle/>
           <a:p>
-            <a:r>
-              <a:rPr lang="en-IN" dirty="0"/>
-              <a:t>INTRODUCTION</a:t>
-            </a:r>
+            <a:endParaRPr lang="en-IN" sz="1800" dirty="0">
+              <a:latin typeface="Trebuchet MS" panose="020B0603020202020204" pitchFamily="34" charset="0"/>
+            </a:endParaRPr>
           </a:p>
         </p:txBody>
       </p:sp>
       <p:pic>
         <p:nvPicPr>
-          <p:cNvPr id="4" name="Content Placeholder 4">
-            <a:extLst>
-              <a:ext uri="{FF2B5EF4-FFF2-40B4-BE49-F238E27FC236}">
-                <a16:creationId xmlns:a16="http://schemas.microsoft.com/office/drawing/2014/main" id="{7583EA47-8978-D3E2-9A2D-16B3875398BA}"/>
+          <p:cNvPr id="20" name="Content Placeholder 4">
+            <a:extLst>
+              <a:ext uri="{FF2B5EF4-FFF2-40B4-BE49-F238E27FC236}">
+                <a16:creationId xmlns:a16="http://schemas.microsoft.com/office/drawing/2014/main" id="{8A98B168-69BD-F030-901E-FCA228A0D663}"/>
               </a:ext>
             </a:extLst>
           </p:cNvPr>
@@ -4546,8 +5616,8 @@
         </p:blipFill>
         <p:spPr>
           <a:xfrm>
-            <a:off x="288234" y="296620"/>
-            <a:ext cx="3643313" cy="1171575"/>
+            <a:off x="288234" y="296621"/>
+            <a:ext cx="2290579" cy="736578"/>
           </a:xfrm>
           <a:prstGeom prst="rect">
             <a:avLst/>
@@ -4556,10 +5626,10 @@
       </p:pic>
       <p:pic>
         <p:nvPicPr>
-          <p:cNvPr id="5" name="Picture 4">
-            <a:extLst>
-              <a:ext uri="{FF2B5EF4-FFF2-40B4-BE49-F238E27FC236}">
-                <a16:creationId xmlns:a16="http://schemas.microsoft.com/office/drawing/2014/main" id="{E6C054FF-B5EF-6978-714A-728BB4C1B181}"/>
+          <p:cNvPr id="21" name="Picture 20">
+            <a:extLst>
+              <a:ext uri="{FF2B5EF4-FFF2-40B4-BE49-F238E27FC236}">
+                <a16:creationId xmlns:a16="http://schemas.microsoft.com/office/drawing/2014/main" id="{D0EBE21F-E3F4-3502-03F3-248572305123}"/>
               </a:ext>
             </a:extLst>
           </p:cNvPr>
@@ -4582,8 +5652,8 @@
         </p:blipFill>
         <p:spPr>
           <a:xfrm>
-            <a:off x="9488142" y="58459"/>
-            <a:ext cx="2657475" cy="1468439"/>
+            <a:off x="10777591" y="140651"/>
+            <a:ext cx="1368026" cy="884123"/>
           </a:xfrm>
           <a:prstGeom prst="rect">
             <a:avLst/>
@@ -4592,10 +5662,10 @@
       </p:pic>
       <p:cxnSp>
         <p:nvCxnSpPr>
-          <p:cNvPr id="6" name="Straight Connector 5">
-            <a:extLst>
-              <a:ext uri="{FF2B5EF4-FFF2-40B4-BE49-F238E27FC236}">
-                <a16:creationId xmlns:a16="http://schemas.microsoft.com/office/drawing/2014/main" id="{327C06CF-21E8-E61B-109E-1D9F84214CFB}"/>
+          <p:cNvPr id="22" name="Straight Connector 21">
+            <a:extLst>
+              <a:ext uri="{FF2B5EF4-FFF2-40B4-BE49-F238E27FC236}">
+                <a16:creationId xmlns:a16="http://schemas.microsoft.com/office/drawing/2014/main" id="{54A95CCD-FAEE-5F21-1300-761968C5C11C}"/>
               </a:ext>
             </a:extLst>
           </p:cNvPr>
@@ -4604,7 +5674,7 @@
         </p:nvCxnSpPr>
         <p:spPr>
           <a:xfrm>
-            <a:off x="0" y="1648031"/>
+            <a:off x="0" y="1105981"/>
             <a:ext cx="12145617" cy="0"/>
           </a:xfrm>
           <a:prstGeom prst="line">
@@ -4637,7 +5707,7 @@
     </p:spTree>
     <p:extLst>
       <p:ext uri="{BB962C8B-B14F-4D97-AF65-F5344CB8AC3E}">
-        <p14:creationId xmlns:p14="http://schemas.microsoft.com/office/powerpoint/2010/main" val="2259509244"/>
+        <p14:creationId xmlns:p14="http://schemas.microsoft.com/office/powerpoint/2010/main" val="2723725069"/>
       </p:ext>
     </p:extLst>
   </p:cSld>
@@ -4647,12 +5717,18 @@
 </p:sld>
 </file>
 
-<file path=ppt/slides/slide4.xml><?xml version="1.0" encoding="utf-8"?>
+<file path=ppt/slides/slide5.xml><?xml version="1.0" encoding="utf-8"?>
 <p:sld xmlns:a="http://schemas.openxmlformats.org/drawingml/2006/main" xmlns:r="http://schemas.openxmlformats.org/officeDocument/2006/relationships" xmlns:p="http://schemas.openxmlformats.org/presentationml/2006/main">
   <p:cSld>
     <p:spTree>
       <p:nvGrpSpPr>
-        <p:cNvPr id="1" name=""/>
+        <p:cNvPr id="1" name="">
+          <a:extLst>
+            <a:ext uri="{FF2B5EF4-FFF2-40B4-BE49-F238E27FC236}">
+              <a16:creationId xmlns:a16="http://schemas.microsoft.com/office/drawing/2014/main" id="{D7C7159E-9CEA-7A11-C63A-3956644869A6}"/>
+            </a:ext>
+          </a:extLst>
+        </p:cNvPr>
         <p:cNvGrpSpPr/>
         <p:nvPr/>
       </p:nvGrpSpPr>
@@ -4666,10 +5742,105 @@
       </p:grpSpPr>
       <p:sp>
         <p:nvSpPr>
-          <p:cNvPr id="3" name="Content Placeholder 2">
-            <a:extLst>
-              <a:ext uri="{FF2B5EF4-FFF2-40B4-BE49-F238E27FC236}">
-                <a16:creationId xmlns:a16="http://schemas.microsoft.com/office/drawing/2014/main" id="{AEACE61A-D17B-B86B-ACE9-BBA31F40E6DB}"/>
+          <p:cNvPr id="15" name="Title 1">
+            <a:extLst>
+              <a:ext uri="{FF2B5EF4-FFF2-40B4-BE49-F238E27FC236}">
+                <a16:creationId xmlns:a16="http://schemas.microsoft.com/office/drawing/2014/main" id="{9B01D687-91DF-35AC-6E8D-75D29D4F0C81}"/>
+              </a:ext>
+            </a:extLst>
+          </p:cNvPr>
+          <p:cNvSpPr txBox="1">
+            <a:spLocks/>
+          </p:cNvSpPr>
+          <p:nvPr/>
+        </p:nvSpPr>
+        <p:spPr>
+          <a:xfrm>
+            <a:off x="691718" y="2034284"/>
+            <a:ext cx="10515600" cy="3914453"/>
+          </a:xfrm>
+          <a:prstGeom prst="rect">
+            <a:avLst/>
+          </a:prstGeom>
+        </p:spPr>
+        <p:txBody>
+          <a:bodyPr vert="horz" lIns="91440" tIns="45720" rIns="91440" bIns="45720" rtlCol="0" anchor="ctr">
+            <a:normAutofit/>
+          </a:bodyPr>
+          <a:lstStyle>
+            <a:lvl1pPr algn="l" defTabSz="914400" rtl="0" eaLnBrk="1" latinLnBrk="0" hangingPunct="1">
+              <a:lnSpc>
+                <a:spcPct val="90000"/>
+              </a:lnSpc>
+              <a:spcBef>
+                <a:spcPct val="0"/>
+              </a:spcBef>
+              <a:buNone/>
+              <a:defRPr sz="4400" kern="1200">
+                <a:solidFill>
+                  <a:schemeClr val="tx1"/>
+                </a:solidFill>
+                <a:latin typeface="+mj-lt"/>
+                <a:ea typeface="+mj-ea"/>
+                <a:cs typeface="+mj-cs"/>
+              </a:defRPr>
+            </a:lvl1pPr>
+          </a:lstStyle>
+          <a:p>
+            <a:r>
+              <a:rPr lang="en-IN" dirty="0"/>
+              <a:t>			</a:t>
+            </a:r>
+          </a:p>
+        </p:txBody>
+      </p:sp>
+      <p:sp>
+        <p:nvSpPr>
+          <p:cNvPr id="18" name="Title 17">
+            <a:extLst>
+              <a:ext uri="{FF2B5EF4-FFF2-40B4-BE49-F238E27FC236}">
+                <a16:creationId xmlns:a16="http://schemas.microsoft.com/office/drawing/2014/main" id="{16612299-3783-51D7-B5DF-94E1BA61946A}"/>
+              </a:ext>
+            </a:extLst>
+          </p:cNvPr>
+          <p:cNvSpPr>
+            <a:spLocks noGrp="1"/>
+          </p:cNvSpPr>
+          <p:nvPr>
+            <p:ph type="title"/>
+          </p:nvPr>
+        </p:nvSpPr>
+        <p:spPr>
+          <a:xfrm>
+            <a:off x="838200" y="1202075"/>
+            <a:ext cx="10515600" cy="595509"/>
+          </a:xfrm>
+        </p:spPr>
+        <p:txBody>
+          <a:bodyPr>
+            <a:normAutofit fontScale="90000"/>
+          </a:bodyPr>
+          <a:lstStyle/>
+          <a:p>
+            <a:pPr algn="ctr"/>
+            <a:r>
+              <a:rPr lang="en-US" dirty="0">
+                <a:latin typeface="Trebuchet MS" panose="020B0603020202020204" pitchFamily="34" charset="0"/>
+              </a:rPr>
+              <a:t>Literature Review</a:t>
+            </a:r>
+            <a:endParaRPr lang="en-IN" dirty="0">
+              <a:latin typeface="Trebuchet MS" panose="020B0603020202020204" pitchFamily="34" charset="0"/>
+            </a:endParaRPr>
+          </a:p>
+        </p:txBody>
+      </p:sp>
+      <p:sp>
+        <p:nvSpPr>
+          <p:cNvPr id="19" name="Content Placeholder 18">
+            <a:extLst>
+              <a:ext uri="{FF2B5EF4-FFF2-40B4-BE49-F238E27FC236}">
+                <a16:creationId xmlns:a16="http://schemas.microsoft.com/office/drawing/2014/main" id="{EB211848-29D9-C466-BC52-1B1E56917423}"/>
               </a:ext>
             </a:extLst>
           </p:cNvPr>
@@ -4680,24 +5851,30 @@
             <p:ph idx="1"/>
           </p:nvPr>
         </p:nvSpPr>
-        <p:spPr/>
-        <p:txBody>
-          <a:bodyPr/>
+        <p:spPr>
+          <a:xfrm>
+            <a:off x="838200" y="1893677"/>
+            <a:ext cx="10515600" cy="4491945"/>
+          </a:xfrm>
+        </p:spPr>
+        <p:txBody>
+          <a:bodyPr>
+            <a:normAutofit/>
+          </a:bodyPr>
           <a:lstStyle/>
           <a:p>
-            <a:r>
-              <a:rPr lang="en-IN" dirty="0"/>
-              <a:t>OBJECTIVE</a:t>
-            </a:r>
+            <a:endParaRPr lang="en-IN" sz="1800" dirty="0">
+              <a:latin typeface="Trebuchet MS" panose="020B0603020202020204" pitchFamily="34" charset="0"/>
+            </a:endParaRPr>
           </a:p>
         </p:txBody>
       </p:sp>
       <p:pic>
         <p:nvPicPr>
-          <p:cNvPr id="4" name="Content Placeholder 4">
-            <a:extLst>
-              <a:ext uri="{FF2B5EF4-FFF2-40B4-BE49-F238E27FC236}">
-                <a16:creationId xmlns:a16="http://schemas.microsoft.com/office/drawing/2014/main" id="{041BBB06-2A7B-8D10-4A0D-04C562985B5C}"/>
+          <p:cNvPr id="20" name="Content Placeholder 4">
+            <a:extLst>
+              <a:ext uri="{FF2B5EF4-FFF2-40B4-BE49-F238E27FC236}">
+                <a16:creationId xmlns:a16="http://schemas.microsoft.com/office/drawing/2014/main" id="{7B8638CB-1340-5491-E3D7-2D2B3062E164}"/>
               </a:ext>
             </a:extLst>
           </p:cNvPr>
@@ -4720,8 +5897,8 @@
         </p:blipFill>
         <p:spPr>
           <a:xfrm>
-            <a:off x="288234" y="296620"/>
-            <a:ext cx="3643313" cy="1171575"/>
+            <a:off x="288234" y="296621"/>
+            <a:ext cx="2290579" cy="736578"/>
           </a:xfrm>
           <a:prstGeom prst="rect">
             <a:avLst/>
@@ -4730,10 +5907,10 @@
       </p:pic>
       <p:pic>
         <p:nvPicPr>
-          <p:cNvPr id="5" name="Picture 4">
-            <a:extLst>
-              <a:ext uri="{FF2B5EF4-FFF2-40B4-BE49-F238E27FC236}">
-                <a16:creationId xmlns:a16="http://schemas.microsoft.com/office/drawing/2014/main" id="{2A9E6C3E-6756-F8F6-56E9-8716A7C5B64E}"/>
+          <p:cNvPr id="21" name="Picture 20">
+            <a:extLst>
+              <a:ext uri="{FF2B5EF4-FFF2-40B4-BE49-F238E27FC236}">
+                <a16:creationId xmlns:a16="http://schemas.microsoft.com/office/drawing/2014/main" id="{02F7D427-6B2E-2DD8-198B-DC180D3AF52D}"/>
               </a:ext>
             </a:extLst>
           </p:cNvPr>
@@ -4756,8 +5933,8 @@
         </p:blipFill>
         <p:spPr>
           <a:xfrm>
-            <a:off x="9488142" y="58459"/>
-            <a:ext cx="2657475" cy="1468439"/>
+            <a:off x="10777591" y="140651"/>
+            <a:ext cx="1368026" cy="884123"/>
           </a:xfrm>
           <a:prstGeom prst="rect">
             <a:avLst/>
@@ -4766,10 +5943,10 @@
       </p:pic>
       <p:cxnSp>
         <p:nvCxnSpPr>
-          <p:cNvPr id="6" name="Straight Connector 5">
-            <a:extLst>
-              <a:ext uri="{FF2B5EF4-FFF2-40B4-BE49-F238E27FC236}">
-                <a16:creationId xmlns:a16="http://schemas.microsoft.com/office/drawing/2014/main" id="{EC906D13-C5F7-DB22-5F61-EB05EB7D315A}"/>
+          <p:cNvPr id="22" name="Straight Connector 21">
+            <a:extLst>
+              <a:ext uri="{FF2B5EF4-FFF2-40B4-BE49-F238E27FC236}">
+                <a16:creationId xmlns:a16="http://schemas.microsoft.com/office/drawing/2014/main" id="{1A20586F-1F18-39AB-9834-016C9662F0BC}"/>
               </a:ext>
             </a:extLst>
           </p:cNvPr>
@@ -4778,7 +5955,7 @@
         </p:nvCxnSpPr>
         <p:spPr>
           <a:xfrm>
-            <a:off x="0" y="1648031"/>
+            <a:off x="0" y="1105981"/>
             <a:ext cx="12145617" cy="0"/>
           </a:xfrm>
           <a:prstGeom prst="line">
@@ -4811,7 +5988,7 @@
     </p:spTree>
     <p:extLst>
       <p:ext uri="{BB962C8B-B14F-4D97-AF65-F5344CB8AC3E}">
-        <p14:creationId xmlns:p14="http://schemas.microsoft.com/office/powerpoint/2010/main" val="3730607122"/>
+        <p14:creationId xmlns:p14="http://schemas.microsoft.com/office/powerpoint/2010/main" val="530208899"/>
       </p:ext>
     </p:extLst>
   </p:cSld>
@@ -4821,12 +5998,18 @@
 </p:sld>
 </file>
 
-<file path=ppt/slides/slide5.xml><?xml version="1.0" encoding="utf-8"?>
+<file path=ppt/slides/slide6.xml><?xml version="1.0" encoding="utf-8"?>
 <p:sld xmlns:a="http://schemas.openxmlformats.org/drawingml/2006/main" xmlns:r="http://schemas.openxmlformats.org/officeDocument/2006/relationships" xmlns:p="http://schemas.openxmlformats.org/presentationml/2006/main">
   <p:cSld>
     <p:spTree>
       <p:nvGrpSpPr>
-        <p:cNvPr id="1" name=""/>
+        <p:cNvPr id="1" name="">
+          <a:extLst>
+            <a:ext uri="{FF2B5EF4-FFF2-40B4-BE49-F238E27FC236}">
+              <a16:creationId xmlns:a16="http://schemas.microsoft.com/office/drawing/2014/main" id="{2B21F2EF-3D8E-26DF-0B25-96040AEDA8E8}"/>
+            </a:ext>
+          </a:extLst>
+        </p:cNvPr>
         <p:cNvGrpSpPr/>
         <p:nvPr/>
       </p:nvGrpSpPr>
@@ -4840,10 +6023,105 @@
       </p:grpSpPr>
       <p:sp>
         <p:nvSpPr>
-          <p:cNvPr id="3" name="Content Placeholder 2">
-            <a:extLst>
-              <a:ext uri="{FF2B5EF4-FFF2-40B4-BE49-F238E27FC236}">
-                <a16:creationId xmlns:a16="http://schemas.microsoft.com/office/drawing/2014/main" id="{A3C755FB-9DFE-A9DD-12D7-76F3AF26E0FA}"/>
+          <p:cNvPr id="15" name="Title 1">
+            <a:extLst>
+              <a:ext uri="{FF2B5EF4-FFF2-40B4-BE49-F238E27FC236}">
+                <a16:creationId xmlns:a16="http://schemas.microsoft.com/office/drawing/2014/main" id="{F9923E21-A5E8-9FA6-C767-4CD32E84250A}"/>
+              </a:ext>
+            </a:extLst>
+          </p:cNvPr>
+          <p:cNvSpPr txBox="1">
+            <a:spLocks/>
+          </p:cNvSpPr>
+          <p:nvPr/>
+        </p:nvSpPr>
+        <p:spPr>
+          <a:xfrm>
+            <a:off x="691718" y="2034284"/>
+            <a:ext cx="10515600" cy="3914453"/>
+          </a:xfrm>
+          <a:prstGeom prst="rect">
+            <a:avLst/>
+          </a:prstGeom>
+        </p:spPr>
+        <p:txBody>
+          <a:bodyPr vert="horz" lIns="91440" tIns="45720" rIns="91440" bIns="45720" rtlCol="0" anchor="ctr">
+            <a:normAutofit/>
+          </a:bodyPr>
+          <a:lstStyle>
+            <a:lvl1pPr algn="l" defTabSz="914400" rtl="0" eaLnBrk="1" latinLnBrk="0" hangingPunct="1">
+              <a:lnSpc>
+                <a:spcPct val="90000"/>
+              </a:lnSpc>
+              <a:spcBef>
+                <a:spcPct val="0"/>
+              </a:spcBef>
+              <a:buNone/>
+              <a:defRPr sz="4400" kern="1200">
+                <a:solidFill>
+                  <a:schemeClr val="tx1"/>
+                </a:solidFill>
+                <a:latin typeface="+mj-lt"/>
+                <a:ea typeface="+mj-ea"/>
+                <a:cs typeface="+mj-cs"/>
+              </a:defRPr>
+            </a:lvl1pPr>
+          </a:lstStyle>
+          <a:p>
+            <a:r>
+              <a:rPr lang="en-IN" dirty="0"/>
+              <a:t>			</a:t>
+            </a:r>
+          </a:p>
+        </p:txBody>
+      </p:sp>
+      <p:sp>
+        <p:nvSpPr>
+          <p:cNvPr id="18" name="Title 17">
+            <a:extLst>
+              <a:ext uri="{FF2B5EF4-FFF2-40B4-BE49-F238E27FC236}">
+                <a16:creationId xmlns:a16="http://schemas.microsoft.com/office/drawing/2014/main" id="{1CD239A6-9BE3-556E-BDE6-9127FAAEA2E8}"/>
+              </a:ext>
+            </a:extLst>
+          </p:cNvPr>
+          <p:cNvSpPr>
+            <a:spLocks noGrp="1"/>
+          </p:cNvSpPr>
+          <p:nvPr>
+            <p:ph type="title"/>
+          </p:nvPr>
+        </p:nvSpPr>
+        <p:spPr>
+          <a:xfrm>
+            <a:off x="838200" y="1202075"/>
+            <a:ext cx="10515600" cy="595509"/>
+          </a:xfrm>
+        </p:spPr>
+        <p:txBody>
+          <a:bodyPr>
+            <a:normAutofit fontScale="90000"/>
+          </a:bodyPr>
+          <a:lstStyle/>
+          <a:p>
+            <a:pPr algn="ctr"/>
+            <a:r>
+              <a:rPr lang="en-US" dirty="0">
+                <a:latin typeface="Trebuchet MS" panose="020B0603020202020204" pitchFamily="34" charset="0"/>
+              </a:rPr>
+              <a:t>Methodology Used</a:t>
+            </a:r>
+            <a:endParaRPr lang="en-IN" dirty="0">
+              <a:latin typeface="Trebuchet MS" panose="020B0603020202020204" pitchFamily="34" charset="0"/>
+            </a:endParaRPr>
+          </a:p>
+        </p:txBody>
+      </p:sp>
+      <p:sp>
+        <p:nvSpPr>
+          <p:cNvPr id="19" name="Content Placeholder 18">
+            <a:extLst>
+              <a:ext uri="{FF2B5EF4-FFF2-40B4-BE49-F238E27FC236}">
+                <a16:creationId xmlns:a16="http://schemas.microsoft.com/office/drawing/2014/main" id="{0AAC9BB9-74B4-8CC4-3995-00DABF4CD9ED}"/>
               </a:ext>
             </a:extLst>
           </p:cNvPr>
@@ -4854,24 +6132,30 @@
             <p:ph idx="1"/>
           </p:nvPr>
         </p:nvSpPr>
-        <p:spPr/>
-        <p:txBody>
-          <a:bodyPr/>
+        <p:spPr>
+          <a:xfrm>
+            <a:off x="838200" y="1893677"/>
+            <a:ext cx="10515600" cy="4491945"/>
+          </a:xfrm>
+        </p:spPr>
+        <p:txBody>
+          <a:bodyPr>
+            <a:normAutofit/>
+          </a:bodyPr>
           <a:lstStyle/>
           <a:p>
-            <a:r>
-              <a:rPr lang="en-IN" dirty="0"/>
-              <a:t>DATA FLOW DIAGRAM</a:t>
-            </a:r>
+            <a:endParaRPr lang="en-IN" sz="1800" dirty="0">
+              <a:latin typeface="Trebuchet MS" panose="020B0603020202020204" pitchFamily="34" charset="0"/>
+            </a:endParaRPr>
           </a:p>
         </p:txBody>
       </p:sp>
       <p:pic>
         <p:nvPicPr>
-          <p:cNvPr id="4" name="Content Placeholder 4">
-            <a:extLst>
-              <a:ext uri="{FF2B5EF4-FFF2-40B4-BE49-F238E27FC236}">
-                <a16:creationId xmlns:a16="http://schemas.microsoft.com/office/drawing/2014/main" id="{2950F7BD-06A8-7C4A-5354-D3F7CE2EA5A6}"/>
+          <p:cNvPr id="20" name="Content Placeholder 4">
+            <a:extLst>
+              <a:ext uri="{FF2B5EF4-FFF2-40B4-BE49-F238E27FC236}">
+                <a16:creationId xmlns:a16="http://schemas.microsoft.com/office/drawing/2014/main" id="{766D554F-754A-1E29-3ADF-C021AB95CB2B}"/>
               </a:ext>
             </a:extLst>
           </p:cNvPr>
@@ -4894,8 +6178,8 @@
         </p:blipFill>
         <p:spPr>
           <a:xfrm>
-            <a:off x="288234" y="296620"/>
-            <a:ext cx="3643313" cy="1171575"/>
+            <a:off x="288234" y="296621"/>
+            <a:ext cx="2290579" cy="736578"/>
           </a:xfrm>
           <a:prstGeom prst="rect">
             <a:avLst/>
@@ -4904,10 +6188,10 @@
       </p:pic>
       <p:pic>
         <p:nvPicPr>
-          <p:cNvPr id="5" name="Picture 4">
-            <a:extLst>
-              <a:ext uri="{FF2B5EF4-FFF2-40B4-BE49-F238E27FC236}">
-                <a16:creationId xmlns:a16="http://schemas.microsoft.com/office/drawing/2014/main" id="{A2F661E9-1512-A56A-DF3C-79B4DE06E3FB}"/>
+          <p:cNvPr id="21" name="Picture 20">
+            <a:extLst>
+              <a:ext uri="{FF2B5EF4-FFF2-40B4-BE49-F238E27FC236}">
+                <a16:creationId xmlns:a16="http://schemas.microsoft.com/office/drawing/2014/main" id="{5946C0CA-D25D-E5D0-9009-59AFFA1633DC}"/>
               </a:ext>
             </a:extLst>
           </p:cNvPr>
@@ -4930,8 +6214,8 @@
         </p:blipFill>
         <p:spPr>
           <a:xfrm>
-            <a:off x="9488142" y="58459"/>
-            <a:ext cx="2657475" cy="1468439"/>
+            <a:off x="10777591" y="140651"/>
+            <a:ext cx="1368026" cy="884123"/>
           </a:xfrm>
           <a:prstGeom prst="rect">
             <a:avLst/>
@@ -4940,10 +6224,10 @@
       </p:pic>
       <p:cxnSp>
         <p:nvCxnSpPr>
-          <p:cNvPr id="6" name="Straight Connector 5">
-            <a:extLst>
-              <a:ext uri="{FF2B5EF4-FFF2-40B4-BE49-F238E27FC236}">
-                <a16:creationId xmlns:a16="http://schemas.microsoft.com/office/drawing/2014/main" id="{AE6A1796-49C8-ABFB-C16B-36918BEED492}"/>
+          <p:cNvPr id="22" name="Straight Connector 21">
+            <a:extLst>
+              <a:ext uri="{FF2B5EF4-FFF2-40B4-BE49-F238E27FC236}">
+                <a16:creationId xmlns:a16="http://schemas.microsoft.com/office/drawing/2014/main" id="{9635A781-EF00-8A63-6FB9-E56AF5533D34}"/>
               </a:ext>
             </a:extLst>
           </p:cNvPr>
@@ -4952,7 +6236,7 @@
         </p:nvCxnSpPr>
         <p:spPr>
           <a:xfrm>
-            <a:off x="0" y="1648031"/>
+            <a:off x="0" y="1105981"/>
             <a:ext cx="12145617" cy="0"/>
           </a:xfrm>
           <a:prstGeom prst="line">
@@ -4985,7 +6269,7 @@
     </p:spTree>
     <p:extLst>
       <p:ext uri="{BB962C8B-B14F-4D97-AF65-F5344CB8AC3E}">
-        <p14:creationId xmlns:p14="http://schemas.microsoft.com/office/powerpoint/2010/main" val="2691661298"/>
+        <p14:creationId xmlns:p14="http://schemas.microsoft.com/office/powerpoint/2010/main" val="3995706678"/>
       </p:ext>
     </p:extLst>
   </p:cSld>
@@ -4995,12 +6279,18 @@
 </p:sld>
 </file>
 
-<file path=ppt/slides/slide6.xml><?xml version="1.0" encoding="utf-8"?>
+<file path=ppt/slides/slide7.xml><?xml version="1.0" encoding="utf-8"?>
 <p:sld xmlns:a="http://schemas.openxmlformats.org/drawingml/2006/main" xmlns:r="http://schemas.openxmlformats.org/officeDocument/2006/relationships" xmlns:p="http://schemas.openxmlformats.org/presentationml/2006/main">
   <p:cSld>
     <p:spTree>
       <p:nvGrpSpPr>
-        <p:cNvPr id="1" name=""/>
+        <p:cNvPr id="1" name="">
+          <a:extLst>
+            <a:ext uri="{FF2B5EF4-FFF2-40B4-BE49-F238E27FC236}">
+              <a16:creationId xmlns:a16="http://schemas.microsoft.com/office/drawing/2014/main" id="{B155934A-587E-F634-ACDA-39BE9D3D14BF}"/>
+            </a:ext>
+          </a:extLst>
+        </p:cNvPr>
         <p:cNvGrpSpPr/>
         <p:nvPr/>
       </p:nvGrpSpPr>
@@ -5014,10 +6304,105 @@
       </p:grpSpPr>
       <p:sp>
         <p:nvSpPr>
-          <p:cNvPr id="3" name="Content Placeholder 2">
-            <a:extLst>
-              <a:ext uri="{FF2B5EF4-FFF2-40B4-BE49-F238E27FC236}">
-                <a16:creationId xmlns:a16="http://schemas.microsoft.com/office/drawing/2014/main" id="{FDF19122-B2F2-D52A-E94F-2FE177B14AC3}"/>
+          <p:cNvPr id="15" name="Title 1">
+            <a:extLst>
+              <a:ext uri="{FF2B5EF4-FFF2-40B4-BE49-F238E27FC236}">
+                <a16:creationId xmlns:a16="http://schemas.microsoft.com/office/drawing/2014/main" id="{3DA77D1C-F121-206C-0361-3CDA700023AA}"/>
+              </a:ext>
+            </a:extLst>
+          </p:cNvPr>
+          <p:cNvSpPr txBox="1">
+            <a:spLocks/>
+          </p:cNvSpPr>
+          <p:nvPr/>
+        </p:nvSpPr>
+        <p:spPr>
+          <a:xfrm>
+            <a:off x="691718" y="2034284"/>
+            <a:ext cx="10515600" cy="3914453"/>
+          </a:xfrm>
+          <a:prstGeom prst="rect">
+            <a:avLst/>
+          </a:prstGeom>
+        </p:spPr>
+        <p:txBody>
+          <a:bodyPr vert="horz" lIns="91440" tIns="45720" rIns="91440" bIns="45720" rtlCol="0" anchor="ctr">
+            <a:normAutofit/>
+          </a:bodyPr>
+          <a:lstStyle>
+            <a:lvl1pPr algn="l" defTabSz="914400" rtl="0" eaLnBrk="1" latinLnBrk="0" hangingPunct="1">
+              <a:lnSpc>
+                <a:spcPct val="90000"/>
+              </a:lnSpc>
+              <a:spcBef>
+                <a:spcPct val="0"/>
+              </a:spcBef>
+              <a:buNone/>
+              <a:defRPr sz="4400" kern="1200">
+                <a:solidFill>
+                  <a:schemeClr val="tx1"/>
+                </a:solidFill>
+                <a:latin typeface="+mj-lt"/>
+                <a:ea typeface="+mj-ea"/>
+                <a:cs typeface="+mj-cs"/>
+              </a:defRPr>
+            </a:lvl1pPr>
+          </a:lstStyle>
+          <a:p>
+            <a:r>
+              <a:rPr lang="en-IN" dirty="0"/>
+              <a:t>			</a:t>
+            </a:r>
+          </a:p>
+        </p:txBody>
+      </p:sp>
+      <p:sp>
+        <p:nvSpPr>
+          <p:cNvPr id="18" name="Title 17">
+            <a:extLst>
+              <a:ext uri="{FF2B5EF4-FFF2-40B4-BE49-F238E27FC236}">
+                <a16:creationId xmlns:a16="http://schemas.microsoft.com/office/drawing/2014/main" id="{225A6E71-D6D1-123D-A85C-AA38BA9E0B46}"/>
+              </a:ext>
+            </a:extLst>
+          </p:cNvPr>
+          <p:cNvSpPr>
+            <a:spLocks noGrp="1"/>
+          </p:cNvSpPr>
+          <p:nvPr>
+            <p:ph type="title"/>
+          </p:nvPr>
+        </p:nvSpPr>
+        <p:spPr>
+          <a:xfrm>
+            <a:off x="838200" y="1202075"/>
+            <a:ext cx="10515600" cy="595509"/>
+          </a:xfrm>
+        </p:spPr>
+        <p:txBody>
+          <a:bodyPr>
+            <a:normAutofit fontScale="90000"/>
+          </a:bodyPr>
+          <a:lstStyle/>
+          <a:p>
+            <a:pPr algn="ctr"/>
+            <a:r>
+              <a:rPr lang="en-US" dirty="0">
+                <a:latin typeface="Trebuchet MS" panose="020B0603020202020204" pitchFamily="34" charset="0"/>
+              </a:rPr>
+              <a:t>Data Flow Diagram/ER-Diagram</a:t>
+            </a:r>
+            <a:endParaRPr lang="en-IN" dirty="0">
+              <a:latin typeface="Trebuchet MS" panose="020B0603020202020204" pitchFamily="34" charset="0"/>
+            </a:endParaRPr>
+          </a:p>
+        </p:txBody>
+      </p:sp>
+      <p:sp>
+        <p:nvSpPr>
+          <p:cNvPr id="19" name="Content Placeholder 18">
+            <a:extLst>
+              <a:ext uri="{FF2B5EF4-FFF2-40B4-BE49-F238E27FC236}">
+                <a16:creationId xmlns:a16="http://schemas.microsoft.com/office/drawing/2014/main" id="{9AB803E0-C564-BCD8-722D-0F47E96A9D6D}"/>
               </a:ext>
             </a:extLst>
           </p:cNvPr>
@@ -5028,24 +6413,30 @@
             <p:ph idx="1"/>
           </p:nvPr>
         </p:nvSpPr>
-        <p:spPr/>
-        <p:txBody>
-          <a:bodyPr/>
+        <p:spPr>
+          <a:xfrm>
+            <a:off x="838200" y="1893677"/>
+            <a:ext cx="10515600" cy="4491945"/>
+          </a:xfrm>
+        </p:spPr>
+        <p:txBody>
+          <a:bodyPr>
+            <a:normAutofit/>
+          </a:bodyPr>
           <a:lstStyle/>
           <a:p>
-            <a:r>
-              <a:rPr lang="en-IN" dirty="0"/>
-              <a:t>ER DIAGRAM</a:t>
-            </a:r>
+            <a:endParaRPr lang="en-IN" sz="1800" dirty="0">
+              <a:latin typeface="Trebuchet MS" panose="020B0603020202020204" pitchFamily="34" charset="0"/>
+            </a:endParaRPr>
           </a:p>
         </p:txBody>
       </p:sp>
       <p:pic>
         <p:nvPicPr>
-          <p:cNvPr id="4" name="Content Placeholder 4">
-            <a:extLst>
-              <a:ext uri="{FF2B5EF4-FFF2-40B4-BE49-F238E27FC236}">
-                <a16:creationId xmlns:a16="http://schemas.microsoft.com/office/drawing/2014/main" id="{861B12A0-1FE0-F811-089B-880414A527D0}"/>
+          <p:cNvPr id="20" name="Content Placeholder 4">
+            <a:extLst>
+              <a:ext uri="{FF2B5EF4-FFF2-40B4-BE49-F238E27FC236}">
+                <a16:creationId xmlns:a16="http://schemas.microsoft.com/office/drawing/2014/main" id="{6646E5F1-C609-9123-F49F-7849A8AC5956}"/>
               </a:ext>
             </a:extLst>
           </p:cNvPr>
@@ -5068,8 +6459,8 @@
         </p:blipFill>
         <p:spPr>
           <a:xfrm>
-            <a:off x="288234" y="296620"/>
-            <a:ext cx="3643313" cy="1171575"/>
+            <a:off x="288234" y="296621"/>
+            <a:ext cx="2290579" cy="736578"/>
           </a:xfrm>
           <a:prstGeom prst="rect">
             <a:avLst/>
@@ -5078,10 +6469,10 @@
       </p:pic>
       <p:pic>
         <p:nvPicPr>
-          <p:cNvPr id="5" name="Picture 4">
-            <a:extLst>
-              <a:ext uri="{FF2B5EF4-FFF2-40B4-BE49-F238E27FC236}">
-                <a16:creationId xmlns:a16="http://schemas.microsoft.com/office/drawing/2014/main" id="{C326D300-E6AC-FE4B-4067-B427FE7FFFE5}"/>
+          <p:cNvPr id="21" name="Picture 20">
+            <a:extLst>
+              <a:ext uri="{FF2B5EF4-FFF2-40B4-BE49-F238E27FC236}">
+                <a16:creationId xmlns:a16="http://schemas.microsoft.com/office/drawing/2014/main" id="{04CF3E42-730F-DD85-8A7D-14A5CAB35098}"/>
               </a:ext>
             </a:extLst>
           </p:cNvPr>
@@ -5104,8 +6495,8 @@
         </p:blipFill>
         <p:spPr>
           <a:xfrm>
-            <a:off x="9488142" y="58459"/>
-            <a:ext cx="2657475" cy="1468439"/>
+            <a:off x="10777591" y="140651"/>
+            <a:ext cx="1368026" cy="884123"/>
           </a:xfrm>
           <a:prstGeom prst="rect">
             <a:avLst/>
@@ -5114,10 +6505,10 @@
       </p:pic>
       <p:cxnSp>
         <p:nvCxnSpPr>
-          <p:cNvPr id="6" name="Straight Connector 5">
-            <a:extLst>
-              <a:ext uri="{FF2B5EF4-FFF2-40B4-BE49-F238E27FC236}">
-                <a16:creationId xmlns:a16="http://schemas.microsoft.com/office/drawing/2014/main" id="{E836DBFE-8CDF-7506-CC75-C263DDB53EF4}"/>
+          <p:cNvPr id="22" name="Straight Connector 21">
+            <a:extLst>
+              <a:ext uri="{FF2B5EF4-FFF2-40B4-BE49-F238E27FC236}">
+                <a16:creationId xmlns:a16="http://schemas.microsoft.com/office/drawing/2014/main" id="{985A858A-D0FA-350C-C0AE-D8DAF75481FF}"/>
               </a:ext>
             </a:extLst>
           </p:cNvPr>
@@ -5126,7 +6517,7 @@
         </p:nvCxnSpPr>
         <p:spPr>
           <a:xfrm>
-            <a:off x="0" y="1648031"/>
+            <a:off x="0" y="1105981"/>
             <a:ext cx="12145617" cy="0"/>
           </a:xfrm>
           <a:prstGeom prst="line">
@@ -5159,7 +6550,7 @@
     </p:spTree>
     <p:extLst>
       <p:ext uri="{BB962C8B-B14F-4D97-AF65-F5344CB8AC3E}">
-        <p14:creationId xmlns:p14="http://schemas.microsoft.com/office/powerpoint/2010/main" val="475401326"/>
+        <p14:creationId xmlns:p14="http://schemas.microsoft.com/office/powerpoint/2010/main" val="2728650858"/>
       </p:ext>
     </p:extLst>
   </p:cSld>
@@ -5169,12 +6560,18 @@
 </p:sld>
 </file>
 
-<file path=ppt/slides/slide7.xml><?xml version="1.0" encoding="utf-8"?>
+<file path=ppt/slides/slide8.xml><?xml version="1.0" encoding="utf-8"?>
 <p:sld xmlns:a="http://schemas.openxmlformats.org/drawingml/2006/main" xmlns:r="http://schemas.openxmlformats.org/officeDocument/2006/relationships" xmlns:p="http://schemas.openxmlformats.org/presentationml/2006/main">
   <p:cSld>
     <p:spTree>
       <p:nvGrpSpPr>
-        <p:cNvPr id="1" name=""/>
+        <p:cNvPr id="1" name="">
+          <a:extLst>
+            <a:ext uri="{FF2B5EF4-FFF2-40B4-BE49-F238E27FC236}">
+              <a16:creationId xmlns:a16="http://schemas.microsoft.com/office/drawing/2014/main" id="{82704332-40D0-DA72-D0C4-5BAF943E167C}"/>
+            </a:ext>
+          </a:extLst>
+        </p:cNvPr>
         <p:cNvGrpSpPr/>
         <p:nvPr/>
       </p:nvGrpSpPr>
@@ -5188,10 +6585,105 @@
       </p:grpSpPr>
       <p:sp>
         <p:nvSpPr>
-          <p:cNvPr id="3" name="Content Placeholder 2">
-            <a:extLst>
-              <a:ext uri="{FF2B5EF4-FFF2-40B4-BE49-F238E27FC236}">
-                <a16:creationId xmlns:a16="http://schemas.microsoft.com/office/drawing/2014/main" id="{64F4D831-143D-41CA-ED61-34DC8ECEEE23}"/>
+          <p:cNvPr id="15" name="Title 1">
+            <a:extLst>
+              <a:ext uri="{FF2B5EF4-FFF2-40B4-BE49-F238E27FC236}">
+                <a16:creationId xmlns:a16="http://schemas.microsoft.com/office/drawing/2014/main" id="{ED93E7A9-B747-7328-776C-A02C2ABEBE75}"/>
+              </a:ext>
+            </a:extLst>
+          </p:cNvPr>
+          <p:cNvSpPr txBox="1">
+            <a:spLocks/>
+          </p:cNvSpPr>
+          <p:nvPr/>
+        </p:nvSpPr>
+        <p:spPr>
+          <a:xfrm>
+            <a:off x="691718" y="2034284"/>
+            <a:ext cx="10515600" cy="3914453"/>
+          </a:xfrm>
+          <a:prstGeom prst="rect">
+            <a:avLst/>
+          </a:prstGeom>
+        </p:spPr>
+        <p:txBody>
+          <a:bodyPr vert="horz" lIns="91440" tIns="45720" rIns="91440" bIns="45720" rtlCol="0" anchor="ctr">
+            <a:normAutofit/>
+          </a:bodyPr>
+          <a:lstStyle>
+            <a:lvl1pPr algn="l" defTabSz="914400" rtl="0" eaLnBrk="1" latinLnBrk="0" hangingPunct="1">
+              <a:lnSpc>
+                <a:spcPct val="90000"/>
+              </a:lnSpc>
+              <a:spcBef>
+                <a:spcPct val="0"/>
+              </a:spcBef>
+              <a:buNone/>
+              <a:defRPr sz="4400" kern="1200">
+                <a:solidFill>
+                  <a:schemeClr val="tx1"/>
+                </a:solidFill>
+                <a:latin typeface="+mj-lt"/>
+                <a:ea typeface="+mj-ea"/>
+                <a:cs typeface="+mj-cs"/>
+              </a:defRPr>
+            </a:lvl1pPr>
+          </a:lstStyle>
+          <a:p>
+            <a:r>
+              <a:rPr lang="en-IN" dirty="0"/>
+              <a:t>			</a:t>
+            </a:r>
+          </a:p>
+        </p:txBody>
+      </p:sp>
+      <p:sp>
+        <p:nvSpPr>
+          <p:cNvPr id="18" name="Title 17">
+            <a:extLst>
+              <a:ext uri="{FF2B5EF4-FFF2-40B4-BE49-F238E27FC236}">
+                <a16:creationId xmlns:a16="http://schemas.microsoft.com/office/drawing/2014/main" id="{A34AB872-88ED-6D6B-98D3-ED6EF186AD43}"/>
+              </a:ext>
+            </a:extLst>
+          </p:cNvPr>
+          <p:cNvSpPr>
+            <a:spLocks noGrp="1"/>
+          </p:cNvSpPr>
+          <p:nvPr>
+            <p:ph type="title"/>
+          </p:nvPr>
+        </p:nvSpPr>
+        <p:spPr>
+          <a:xfrm>
+            <a:off x="838200" y="1202075"/>
+            <a:ext cx="10515600" cy="595509"/>
+          </a:xfrm>
+        </p:spPr>
+        <p:txBody>
+          <a:bodyPr>
+            <a:normAutofit fontScale="90000"/>
+          </a:bodyPr>
+          <a:lstStyle/>
+          <a:p>
+            <a:pPr algn="ctr"/>
+            <a:r>
+              <a:rPr lang="en-US" dirty="0">
+                <a:latin typeface="Trebuchet MS" panose="020B0603020202020204" pitchFamily="34" charset="0"/>
+              </a:rPr>
+              <a:t>Progress &amp; Result</a:t>
+            </a:r>
+            <a:endParaRPr lang="en-IN" dirty="0">
+              <a:latin typeface="Trebuchet MS" panose="020B0603020202020204" pitchFamily="34" charset="0"/>
+            </a:endParaRPr>
+          </a:p>
+        </p:txBody>
+      </p:sp>
+      <p:sp>
+        <p:nvSpPr>
+          <p:cNvPr id="19" name="Content Placeholder 18">
+            <a:extLst>
+              <a:ext uri="{FF2B5EF4-FFF2-40B4-BE49-F238E27FC236}">
+                <a16:creationId xmlns:a16="http://schemas.microsoft.com/office/drawing/2014/main" id="{E963ED00-52C9-A7C8-D6AE-C6E626CA361F}"/>
               </a:ext>
             </a:extLst>
           </p:cNvPr>
@@ -5202,24 +6694,30 @@
             <p:ph idx="1"/>
           </p:nvPr>
         </p:nvSpPr>
-        <p:spPr/>
-        <p:txBody>
-          <a:bodyPr/>
+        <p:spPr>
+          <a:xfrm>
+            <a:off x="838200" y="1893677"/>
+            <a:ext cx="10515600" cy="4491945"/>
+          </a:xfrm>
+        </p:spPr>
+        <p:txBody>
+          <a:bodyPr>
+            <a:normAutofit/>
+          </a:bodyPr>
           <a:lstStyle/>
           <a:p>
-            <a:r>
-              <a:rPr lang="en-IN" dirty="0"/>
-              <a:t>RELEVANCE TO REAL WORLD PROBLEMS</a:t>
-            </a:r>
+            <a:endParaRPr lang="en-IN" sz="1800" dirty="0">
+              <a:latin typeface="Trebuchet MS" panose="020B0603020202020204" pitchFamily="34" charset="0"/>
+            </a:endParaRPr>
           </a:p>
         </p:txBody>
       </p:sp>
       <p:pic>
         <p:nvPicPr>
-          <p:cNvPr id="4" name="Content Placeholder 4">
-            <a:extLst>
-              <a:ext uri="{FF2B5EF4-FFF2-40B4-BE49-F238E27FC236}">
-                <a16:creationId xmlns:a16="http://schemas.microsoft.com/office/drawing/2014/main" id="{0C7E1BD4-C758-8692-0B0C-D3262EEA4AC0}"/>
+          <p:cNvPr id="20" name="Content Placeholder 4">
+            <a:extLst>
+              <a:ext uri="{FF2B5EF4-FFF2-40B4-BE49-F238E27FC236}">
+                <a16:creationId xmlns:a16="http://schemas.microsoft.com/office/drawing/2014/main" id="{16C97E68-F9CA-CE3C-9DD1-F5285F14C34D}"/>
               </a:ext>
             </a:extLst>
           </p:cNvPr>
@@ -5242,8 +6740,8 @@
         </p:blipFill>
         <p:spPr>
           <a:xfrm>
-            <a:off x="288234" y="296620"/>
-            <a:ext cx="3643313" cy="1171575"/>
+            <a:off x="288234" y="296621"/>
+            <a:ext cx="2290579" cy="736578"/>
           </a:xfrm>
           <a:prstGeom prst="rect">
             <a:avLst/>
@@ -5252,10 +6750,10 @@
       </p:pic>
       <p:pic>
         <p:nvPicPr>
-          <p:cNvPr id="5" name="Picture 4">
-            <a:extLst>
-              <a:ext uri="{FF2B5EF4-FFF2-40B4-BE49-F238E27FC236}">
-                <a16:creationId xmlns:a16="http://schemas.microsoft.com/office/drawing/2014/main" id="{5839B599-417C-DF7B-10AD-18F2E20A4034}"/>
+          <p:cNvPr id="21" name="Picture 20">
+            <a:extLst>
+              <a:ext uri="{FF2B5EF4-FFF2-40B4-BE49-F238E27FC236}">
+                <a16:creationId xmlns:a16="http://schemas.microsoft.com/office/drawing/2014/main" id="{838FFA33-99FD-C2AD-1B63-6C16DA93EB72}"/>
               </a:ext>
             </a:extLst>
           </p:cNvPr>
@@ -5278,8 +6776,8 @@
         </p:blipFill>
         <p:spPr>
           <a:xfrm>
-            <a:off x="9488142" y="58459"/>
-            <a:ext cx="2657475" cy="1468439"/>
+            <a:off x="10777591" y="140651"/>
+            <a:ext cx="1368026" cy="884123"/>
           </a:xfrm>
           <a:prstGeom prst="rect">
             <a:avLst/>
@@ -5288,10 +6786,10 @@
       </p:pic>
       <p:cxnSp>
         <p:nvCxnSpPr>
-          <p:cNvPr id="6" name="Straight Connector 5">
-            <a:extLst>
-              <a:ext uri="{FF2B5EF4-FFF2-40B4-BE49-F238E27FC236}">
-                <a16:creationId xmlns:a16="http://schemas.microsoft.com/office/drawing/2014/main" id="{E725019E-9EFB-7596-11B0-427C6908A506}"/>
+          <p:cNvPr id="22" name="Straight Connector 21">
+            <a:extLst>
+              <a:ext uri="{FF2B5EF4-FFF2-40B4-BE49-F238E27FC236}">
+                <a16:creationId xmlns:a16="http://schemas.microsoft.com/office/drawing/2014/main" id="{BAB97052-C251-9874-AE46-5057EA49F4B9}"/>
               </a:ext>
             </a:extLst>
           </p:cNvPr>
@@ -5300,7 +6798,7 @@
         </p:nvCxnSpPr>
         <p:spPr>
           <a:xfrm>
-            <a:off x="0" y="1648031"/>
+            <a:off x="0" y="1105981"/>
             <a:ext cx="12145617" cy="0"/>
           </a:xfrm>
           <a:prstGeom prst="line">
@@ -5333,7 +6831,7 @@
     </p:spTree>
     <p:extLst>
       <p:ext uri="{BB962C8B-B14F-4D97-AF65-F5344CB8AC3E}">
-        <p14:creationId xmlns:p14="http://schemas.microsoft.com/office/powerpoint/2010/main" val="3857613339"/>
+        <p14:creationId xmlns:p14="http://schemas.microsoft.com/office/powerpoint/2010/main" val="2433006367"/>
       </p:ext>
     </p:extLst>
   </p:cSld>
@@ -5343,12 +6841,18 @@
 </p:sld>
 </file>
 
-<file path=ppt/slides/slide8.xml><?xml version="1.0" encoding="utf-8"?>
+<file path=ppt/slides/slide9.xml><?xml version="1.0" encoding="utf-8"?>
 <p:sld xmlns:a="http://schemas.openxmlformats.org/drawingml/2006/main" xmlns:r="http://schemas.openxmlformats.org/officeDocument/2006/relationships" xmlns:p="http://schemas.openxmlformats.org/presentationml/2006/main">
   <p:cSld>
     <p:spTree>
       <p:nvGrpSpPr>
-        <p:cNvPr id="1" name=""/>
+        <p:cNvPr id="1" name="">
+          <a:extLst>
+            <a:ext uri="{FF2B5EF4-FFF2-40B4-BE49-F238E27FC236}">
+              <a16:creationId xmlns:a16="http://schemas.microsoft.com/office/drawing/2014/main" id="{1D94BAFA-C592-6E55-F818-230D80E5310A}"/>
+            </a:ext>
+          </a:extLst>
+        </p:cNvPr>
         <p:cNvGrpSpPr/>
         <p:nvPr/>
       </p:nvGrpSpPr>
@@ -5362,10 +6866,105 @@
       </p:grpSpPr>
       <p:sp>
         <p:nvSpPr>
-          <p:cNvPr id="3" name="Content Placeholder 2">
-            <a:extLst>
-              <a:ext uri="{FF2B5EF4-FFF2-40B4-BE49-F238E27FC236}">
-                <a16:creationId xmlns:a16="http://schemas.microsoft.com/office/drawing/2014/main" id="{2A40B938-47BC-1FAC-9D38-E3A1D8D77B08}"/>
+          <p:cNvPr id="15" name="Title 1">
+            <a:extLst>
+              <a:ext uri="{FF2B5EF4-FFF2-40B4-BE49-F238E27FC236}">
+                <a16:creationId xmlns:a16="http://schemas.microsoft.com/office/drawing/2014/main" id="{EA917874-E942-8E27-5727-4CF761368A00}"/>
+              </a:ext>
+            </a:extLst>
+          </p:cNvPr>
+          <p:cNvSpPr txBox="1">
+            <a:spLocks/>
+          </p:cNvSpPr>
+          <p:nvPr/>
+        </p:nvSpPr>
+        <p:spPr>
+          <a:xfrm>
+            <a:off x="691718" y="2034284"/>
+            <a:ext cx="10515600" cy="3914453"/>
+          </a:xfrm>
+          <a:prstGeom prst="rect">
+            <a:avLst/>
+          </a:prstGeom>
+        </p:spPr>
+        <p:txBody>
+          <a:bodyPr vert="horz" lIns="91440" tIns="45720" rIns="91440" bIns="45720" rtlCol="0" anchor="ctr">
+            <a:normAutofit/>
+          </a:bodyPr>
+          <a:lstStyle>
+            <a:lvl1pPr algn="l" defTabSz="914400" rtl="0" eaLnBrk="1" latinLnBrk="0" hangingPunct="1">
+              <a:lnSpc>
+                <a:spcPct val="90000"/>
+              </a:lnSpc>
+              <a:spcBef>
+                <a:spcPct val="0"/>
+              </a:spcBef>
+              <a:buNone/>
+              <a:defRPr sz="4400" kern="1200">
+                <a:solidFill>
+                  <a:schemeClr val="tx1"/>
+                </a:solidFill>
+                <a:latin typeface="+mj-lt"/>
+                <a:ea typeface="+mj-ea"/>
+                <a:cs typeface="+mj-cs"/>
+              </a:defRPr>
+            </a:lvl1pPr>
+          </a:lstStyle>
+          <a:p>
+            <a:r>
+              <a:rPr lang="en-IN" dirty="0"/>
+              <a:t>			</a:t>
+            </a:r>
+          </a:p>
+        </p:txBody>
+      </p:sp>
+      <p:sp>
+        <p:nvSpPr>
+          <p:cNvPr id="18" name="Title 17">
+            <a:extLst>
+              <a:ext uri="{FF2B5EF4-FFF2-40B4-BE49-F238E27FC236}">
+                <a16:creationId xmlns:a16="http://schemas.microsoft.com/office/drawing/2014/main" id="{6797BE05-8F59-7FA4-8DFC-C78CE047B1EB}"/>
+              </a:ext>
+            </a:extLst>
+          </p:cNvPr>
+          <p:cNvSpPr>
+            <a:spLocks noGrp="1"/>
+          </p:cNvSpPr>
+          <p:nvPr>
+            <p:ph type="title"/>
+          </p:nvPr>
+        </p:nvSpPr>
+        <p:spPr>
+          <a:xfrm>
+            <a:off x="838200" y="1202075"/>
+            <a:ext cx="10515600" cy="595509"/>
+          </a:xfrm>
+        </p:spPr>
+        <p:txBody>
+          <a:bodyPr>
+            <a:normAutofit fontScale="90000"/>
+          </a:bodyPr>
+          <a:lstStyle/>
+          <a:p>
+            <a:pPr algn="ctr"/>
+            <a:r>
+              <a:rPr lang="en-US" dirty="0">
+                <a:latin typeface="Trebuchet MS" panose="020B0603020202020204" pitchFamily="34" charset="0"/>
+              </a:rPr>
+              <a:t>Future Work</a:t>
+            </a:r>
+            <a:endParaRPr lang="en-IN" dirty="0">
+              <a:latin typeface="Trebuchet MS" panose="020B0603020202020204" pitchFamily="34" charset="0"/>
+            </a:endParaRPr>
+          </a:p>
+        </p:txBody>
+      </p:sp>
+      <p:sp>
+        <p:nvSpPr>
+          <p:cNvPr id="19" name="Content Placeholder 18">
+            <a:extLst>
+              <a:ext uri="{FF2B5EF4-FFF2-40B4-BE49-F238E27FC236}">
+                <a16:creationId xmlns:a16="http://schemas.microsoft.com/office/drawing/2014/main" id="{576252F9-7407-F97F-6D97-2D0D9E6467B1}"/>
               </a:ext>
             </a:extLst>
           </p:cNvPr>
@@ -5376,27 +6975,30 @@
             <p:ph idx="1"/>
           </p:nvPr>
         </p:nvSpPr>
-        <p:spPr/>
-        <p:txBody>
-          <a:bodyPr/>
+        <p:spPr>
+          <a:xfrm>
+            <a:off x="838200" y="1893677"/>
+            <a:ext cx="10515600" cy="4491945"/>
+          </a:xfrm>
+        </p:spPr>
+        <p:txBody>
+          <a:bodyPr>
+            <a:normAutofit/>
+          </a:bodyPr>
           <a:lstStyle/>
           <a:p>
-            <a:r>
-              <a:rPr lang="en-IN" dirty="0"/>
-              <a:t>RELEVANCE TO REAL WORLD PROBLEMS</a:t>
-            </a:r>
-          </a:p>
-          <a:p>
-            <a:endParaRPr lang="en-IN" dirty="0"/>
+            <a:endParaRPr lang="en-IN" sz="1800" dirty="0">
+              <a:latin typeface="Trebuchet MS" panose="020B0603020202020204" pitchFamily="34" charset="0"/>
+            </a:endParaRPr>
           </a:p>
         </p:txBody>
       </p:sp>
       <p:pic>
         <p:nvPicPr>
-          <p:cNvPr id="4" name="Content Placeholder 4">
-            <a:extLst>
-              <a:ext uri="{FF2B5EF4-FFF2-40B4-BE49-F238E27FC236}">
-                <a16:creationId xmlns:a16="http://schemas.microsoft.com/office/drawing/2014/main" id="{A158A9AD-50FB-A088-297E-75865CEB4BA8}"/>
+          <p:cNvPr id="20" name="Content Placeholder 4">
+            <a:extLst>
+              <a:ext uri="{FF2B5EF4-FFF2-40B4-BE49-F238E27FC236}">
+                <a16:creationId xmlns:a16="http://schemas.microsoft.com/office/drawing/2014/main" id="{EB1D0318-6550-EC88-F3AF-851BB4016D12}"/>
               </a:ext>
             </a:extLst>
           </p:cNvPr>
@@ -5419,8 +7021,8 @@
         </p:blipFill>
         <p:spPr>
           <a:xfrm>
-            <a:off x="288234" y="296620"/>
-            <a:ext cx="3643313" cy="1171575"/>
+            <a:off x="288234" y="296621"/>
+            <a:ext cx="2290579" cy="736578"/>
           </a:xfrm>
           <a:prstGeom prst="rect">
             <a:avLst/>
@@ -5429,10 +7031,10 @@
       </p:pic>
       <p:pic>
         <p:nvPicPr>
-          <p:cNvPr id="5" name="Picture 4">
-            <a:extLst>
-              <a:ext uri="{FF2B5EF4-FFF2-40B4-BE49-F238E27FC236}">
-                <a16:creationId xmlns:a16="http://schemas.microsoft.com/office/drawing/2014/main" id="{022644DD-BBD0-C82A-8AAE-C848F88E2EAA}"/>
+          <p:cNvPr id="21" name="Picture 20">
+            <a:extLst>
+              <a:ext uri="{FF2B5EF4-FFF2-40B4-BE49-F238E27FC236}">
+                <a16:creationId xmlns:a16="http://schemas.microsoft.com/office/drawing/2014/main" id="{D621C906-46E9-BD68-7B7C-DF38DA05B11C}"/>
               </a:ext>
             </a:extLst>
           </p:cNvPr>
@@ -5455,8 +7057,8 @@
         </p:blipFill>
         <p:spPr>
           <a:xfrm>
-            <a:off x="9488142" y="58459"/>
-            <a:ext cx="2657475" cy="1468439"/>
+            <a:off x="10777591" y="140651"/>
+            <a:ext cx="1368026" cy="884123"/>
           </a:xfrm>
           <a:prstGeom prst="rect">
             <a:avLst/>
@@ -5465,10 +7067,10 @@
       </p:pic>
       <p:cxnSp>
         <p:nvCxnSpPr>
-          <p:cNvPr id="6" name="Straight Connector 5">
-            <a:extLst>
-              <a:ext uri="{FF2B5EF4-FFF2-40B4-BE49-F238E27FC236}">
-                <a16:creationId xmlns:a16="http://schemas.microsoft.com/office/drawing/2014/main" id="{6B8F0D35-DC23-BF3D-7009-A7873763454E}"/>
+          <p:cNvPr id="22" name="Straight Connector 21">
+            <a:extLst>
+              <a:ext uri="{FF2B5EF4-FFF2-40B4-BE49-F238E27FC236}">
+                <a16:creationId xmlns:a16="http://schemas.microsoft.com/office/drawing/2014/main" id="{47CAD0B6-0563-E4E4-4ADE-CCEEE57C51FF}"/>
               </a:ext>
             </a:extLst>
           </p:cNvPr>
@@ -5477,7 +7079,7 @@
         </p:nvCxnSpPr>
         <p:spPr>
           <a:xfrm>
-            <a:off x="0" y="1648031"/>
+            <a:off x="0" y="1105981"/>
             <a:ext cx="12145617" cy="0"/>
           </a:xfrm>
           <a:prstGeom prst="line">
@@ -5510,184 +7112,7 @@
     </p:spTree>
     <p:extLst>
       <p:ext uri="{BB962C8B-B14F-4D97-AF65-F5344CB8AC3E}">
-        <p14:creationId xmlns:p14="http://schemas.microsoft.com/office/powerpoint/2010/main" val="3092544277"/>
-      </p:ext>
-    </p:extLst>
-  </p:cSld>
-  <p:clrMapOvr>
-    <a:masterClrMapping/>
-  </p:clrMapOvr>
-</p:sld>
-</file>
-
-<file path=ppt/slides/slide9.xml><?xml version="1.0" encoding="utf-8"?>
-<p:sld xmlns:a="http://schemas.openxmlformats.org/drawingml/2006/main" xmlns:r="http://schemas.openxmlformats.org/officeDocument/2006/relationships" xmlns:p="http://schemas.openxmlformats.org/presentationml/2006/main">
-  <p:cSld>
-    <p:spTree>
-      <p:nvGrpSpPr>
-        <p:cNvPr id="1" name=""/>
-        <p:cNvGrpSpPr/>
-        <p:nvPr/>
-      </p:nvGrpSpPr>
-      <p:grpSpPr>
-        <a:xfrm>
-          <a:off x="0" y="0"/>
-          <a:ext cx="0" cy="0"/>
-          <a:chOff x="0" y="0"/>
-          <a:chExt cx="0" cy="0"/>
-        </a:xfrm>
-      </p:grpSpPr>
-      <p:sp>
-        <p:nvSpPr>
-          <p:cNvPr id="3" name="Content Placeholder 2">
-            <a:extLst>
-              <a:ext uri="{FF2B5EF4-FFF2-40B4-BE49-F238E27FC236}">
-                <a16:creationId xmlns:a16="http://schemas.microsoft.com/office/drawing/2014/main" id="{2167963C-AC3B-E1D0-4552-16BF66B74AA9}"/>
-              </a:ext>
-            </a:extLst>
-          </p:cNvPr>
-          <p:cNvSpPr>
-            <a:spLocks noGrp="1"/>
-          </p:cNvSpPr>
-          <p:nvPr>
-            <p:ph idx="1"/>
-          </p:nvPr>
-        </p:nvSpPr>
-        <p:spPr/>
-        <p:txBody>
-          <a:bodyPr/>
-          <a:lstStyle/>
-          <a:p>
-            <a:r>
-              <a:rPr lang="en-IN" dirty="0"/>
-              <a:t>RELEVANCE TO REAL WORLD PROBLEMS</a:t>
-            </a:r>
-          </a:p>
-          <a:p>
-            <a:endParaRPr lang="en-IN" dirty="0"/>
-          </a:p>
-        </p:txBody>
-      </p:sp>
-      <p:pic>
-        <p:nvPicPr>
-          <p:cNvPr id="4" name="Content Placeholder 4">
-            <a:extLst>
-              <a:ext uri="{FF2B5EF4-FFF2-40B4-BE49-F238E27FC236}">
-                <a16:creationId xmlns:a16="http://schemas.microsoft.com/office/drawing/2014/main" id="{60E77E4B-80AC-728F-4252-E785A2A945BA}"/>
-              </a:ext>
-            </a:extLst>
-          </p:cNvPr>
-          <p:cNvPicPr>
-            <a:picLocks noChangeAspect="1"/>
-          </p:cNvPicPr>
-          <p:nvPr/>
-        </p:nvPicPr>
-        <p:blipFill>
-          <a:blip r:embed="rId2">
-            <a:extLst>
-              <a:ext uri="{28A0092B-C50C-407E-A947-70E740481C1C}">
-                <a14:useLocalDpi xmlns:a14="http://schemas.microsoft.com/office/drawing/2010/main" val="0"/>
-              </a:ext>
-            </a:extLst>
-          </a:blip>
-          <a:stretch>
-            <a:fillRect/>
-          </a:stretch>
-        </p:blipFill>
-        <p:spPr>
-          <a:xfrm>
-            <a:off x="288234" y="296620"/>
-            <a:ext cx="3643313" cy="1171575"/>
-          </a:xfrm>
-          <a:prstGeom prst="rect">
-            <a:avLst/>
-          </a:prstGeom>
-        </p:spPr>
-      </p:pic>
-      <p:pic>
-        <p:nvPicPr>
-          <p:cNvPr id="5" name="Picture 4">
-            <a:extLst>
-              <a:ext uri="{FF2B5EF4-FFF2-40B4-BE49-F238E27FC236}">
-                <a16:creationId xmlns:a16="http://schemas.microsoft.com/office/drawing/2014/main" id="{69DB303C-D69D-0C47-3E65-422206171173}"/>
-              </a:ext>
-            </a:extLst>
-          </p:cNvPr>
-          <p:cNvPicPr>
-            <a:picLocks noChangeAspect="1"/>
-          </p:cNvPicPr>
-          <p:nvPr/>
-        </p:nvPicPr>
-        <p:blipFill>
-          <a:blip r:embed="rId3">
-            <a:extLst>
-              <a:ext uri="{28A0092B-C50C-407E-A947-70E740481C1C}">
-                <a14:useLocalDpi xmlns:a14="http://schemas.microsoft.com/office/drawing/2010/main" val="0"/>
-              </a:ext>
-            </a:extLst>
-          </a:blip>
-          <a:stretch>
-            <a:fillRect/>
-          </a:stretch>
-        </p:blipFill>
-        <p:spPr>
-          <a:xfrm>
-            <a:off x="9488142" y="58459"/>
-            <a:ext cx="2657475" cy="1468439"/>
-          </a:xfrm>
-          <a:prstGeom prst="rect">
-            <a:avLst/>
-          </a:prstGeom>
-        </p:spPr>
-      </p:pic>
-      <p:cxnSp>
-        <p:nvCxnSpPr>
-          <p:cNvPr id="6" name="Straight Connector 5">
-            <a:extLst>
-              <a:ext uri="{FF2B5EF4-FFF2-40B4-BE49-F238E27FC236}">
-                <a16:creationId xmlns:a16="http://schemas.microsoft.com/office/drawing/2014/main" id="{073308F8-A510-3933-7CFF-BEB4B9D960CE}"/>
-              </a:ext>
-            </a:extLst>
-          </p:cNvPr>
-          <p:cNvCxnSpPr/>
-          <p:nvPr/>
-        </p:nvCxnSpPr>
-        <p:spPr>
-          <a:xfrm>
-            <a:off x="0" y="1648031"/>
-            <a:ext cx="12145617" cy="0"/>
-          </a:xfrm>
-          <a:prstGeom prst="line">
-            <a:avLst/>
-          </a:prstGeom>
-          <a:scene3d>
-            <a:camera prst="orthographicFront"/>
-            <a:lightRig rig="threePt" dir="t"/>
-          </a:scene3d>
-          <a:sp3d extrusionH="50800" contourW="19050">
-            <a:bevelT w="95250"/>
-            <a:bevelB w="114300"/>
-          </a:sp3d>
-        </p:spPr>
-        <p:style>
-          <a:lnRef idx="1">
-            <a:schemeClr val="accent1"/>
-          </a:lnRef>
-          <a:fillRef idx="0">
-            <a:schemeClr val="accent1"/>
-          </a:fillRef>
-          <a:effectRef idx="0">
-            <a:schemeClr val="accent1"/>
-          </a:effectRef>
-          <a:fontRef idx="minor">
-            <a:schemeClr val="tx1"/>
-          </a:fontRef>
-        </p:style>
-      </p:cxnSp>
-    </p:spTree>
-    <p:extLst>
-      <p:ext uri="{BB962C8B-B14F-4D97-AF65-F5344CB8AC3E}">
-        <p14:creationId xmlns:p14="http://schemas.microsoft.com/office/powerpoint/2010/main" val="604001977"/>
+        <p14:creationId xmlns:p14="http://schemas.microsoft.com/office/powerpoint/2010/main" val="3282002688"/>
       </p:ext>
     </p:extLst>
   </p:cSld>
@@ -6285,4 +7710,299 @@
     </a:ext>
   </a:extLst>
 </a:theme>
+</file>
+
+<file path=ppt/theme/theme3.xml><?xml version="1.0" encoding="utf-8"?>
+<a:theme xmlns:a="http://schemas.openxmlformats.org/drawingml/2006/main" name="Office Theme">
+  <a:themeElements>
+    <a:clrScheme name="Office">
+      <a:dk1>
+        <a:sysClr val="windowText" lastClr="000000"/>
+      </a:dk1>
+      <a:lt1>
+        <a:sysClr val="window" lastClr="FFFFFF"/>
+      </a:lt1>
+      <a:dk2>
+        <a:srgbClr val="44546A"/>
+      </a:dk2>
+      <a:lt2>
+        <a:srgbClr val="E7E6E6"/>
+      </a:lt2>
+      <a:accent1>
+        <a:srgbClr val="4472C4"/>
+      </a:accent1>
+      <a:accent2>
+        <a:srgbClr val="ED7D31"/>
+      </a:accent2>
+      <a:accent3>
+        <a:srgbClr val="A5A5A5"/>
+      </a:accent3>
+      <a:accent4>
+        <a:srgbClr val="FFC000"/>
+      </a:accent4>
+      <a:accent5>
+        <a:srgbClr val="5B9BD5"/>
+      </a:accent5>
+      <a:accent6>
+        <a:srgbClr val="70AD47"/>
+      </a:accent6>
+      <a:hlink>
+        <a:srgbClr val="0563C1"/>
+      </a:hlink>
+      <a:folHlink>
+        <a:srgbClr val="954F72"/>
+      </a:folHlink>
+    </a:clrScheme>
+    <a:fontScheme name="Office">
+      <a:majorFont>
+        <a:latin typeface="Calibri Light" panose="020F0302020204030204"/>
+        <a:ea typeface=""/>
+        <a:cs typeface=""/>
+        <a:font script="Jpan" typeface="游ゴシック Light"/>
+        <a:font script="Hang" typeface="맑은 고딕"/>
+        <a:font script="Hans" typeface="等线 Light"/>
+        <a:font script="Hant" typeface="新細明體"/>
+        <a:font script="Arab" typeface="Times New Roman"/>
+        <a:font script="Hebr" typeface="Times New Roman"/>
+        <a:font script="Thai" typeface="Angsana New"/>
+        <a:font script="Ethi" typeface="Nyala"/>
+        <a:font script="Beng" typeface="Vrinda"/>
+        <a:font script="Gujr" typeface="Shruti"/>
+        <a:font script="Khmr" typeface="MoolBoran"/>
+        <a:font script="Knda" typeface="Tunga"/>
+        <a:font script="Guru" typeface="Raavi"/>
+        <a:font script="Cans" typeface="Euphemia"/>
+        <a:font script="Cher" typeface="Plantagenet Cherokee"/>
+        <a:font script="Yiii" typeface="Microsoft Yi Baiti"/>
+        <a:font script="Tibt" typeface="Microsoft Himalaya"/>
+        <a:font script="Thaa" typeface="MV Boli"/>
+        <a:font script="Deva" typeface="Mangal"/>
+        <a:font script="Telu" typeface="Gautami"/>
+        <a:font script="Taml" typeface="Latha"/>
+        <a:font script="Syrc" typeface="Estrangelo Edessa"/>
+        <a:font script="Orya" typeface="Kalinga"/>
+        <a:font script="Mlym" typeface="Kartika"/>
+        <a:font script="Laoo" typeface="DokChampa"/>
+        <a:font script="Sinh" typeface="Iskoola Pota"/>
+        <a:font script="Mong" typeface="Mongolian Baiti"/>
+        <a:font script="Viet" typeface="Times New Roman"/>
+        <a:font script="Uigh" typeface="Microsoft Uighur"/>
+        <a:font script="Geor" typeface="Sylfaen"/>
+        <a:font script="Armn" typeface="Arial"/>
+        <a:font script="Bugi" typeface="Leelawadee UI"/>
+        <a:font script="Bopo" typeface="Microsoft JhengHei"/>
+        <a:font script="Java" typeface="Javanese Text"/>
+        <a:font script="Lisu" typeface="Segoe UI"/>
+        <a:font script="Mymr" typeface="Myanmar Text"/>
+        <a:font script="Nkoo" typeface="Ebrima"/>
+        <a:font script="Olck" typeface="Nirmala UI"/>
+        <a:font script="Osma" typeface="Ebrima"/>
+        <a:font script="Phag" typeface="Phagspa"/>
+        <a:font script="Syrn" typeface="Estrangelo Edessa"/>
+        <a:font script="Syrj" typeface="Estrangelo Edessa"/>
+        <a:font script="Syre" typeface="Estrangelo Edessa"/>
+        <a:font script="Sora" typeface="Nirmala UI"/>
+        <a:font script="Tale" typeface="Microsoft Tai Le"/>
+        <a:font script="Talu" typeface="Microsoft New Tai Lue"/>
+        <a:font script="Tfng" typeface="Ebrima"/>
+      </a:majorFont>
+      <a:minorFont>
+        <a:latin typeface="Calibri" panose="020F0502020204030204"/>
+        <a:ea typeface=""/>
+        <a:cs typeface=""/>
+        <a:font script="Jpan" typeface="游ゴシック"/>
+        <a:font script="Hang" typeface="맑은 고딕"/>
+        <a:font script="Hans" typeface="等线"/>
+        <a:font script="Hant" typeface="新細明體"/>
+        <a:font script="Arab" typeface="Arial"/>
+        <a:font script="Hebr" typeface="Arial"/>
+        <a:font script="Thai" typeface="Cordia New"/>
+        <a:font script="Ethi" typeface="Nyala"/>
+        <a:font script="Beng" typeface="Vrinda"/>
+        <a:font script="Gujr" typeface="Shruti"/>
+        <a:font script="Khmr" typeface="DaunPenh"/>
+        <a:font script="Knda" typeface="Tunga"/>
+        <a:font script="Guru" typeface="Raavi"/>
+        <a:font script="Cans" typeface="Euphemia"/>
+        <a:font script="Cher" typeface="Plantagenet Cherokee"/>
+        <a:font script="Yiii" typeface="Microsoft Yi Baiti"/>
+        <a:font script="Tibt" typeface="Microsoft Himalaya"/>
+        <a:font script="Thaa" typeface="MV Boli"/>
+        <a:font script="Deva" typeface="Mangal"/>
+        <a:font script="Telu" typeface="Gautami"/>
+        <a:font script="Taml" typeface="Latha"/>
+        <a:font script="Syrc" typeface="Estrangelo Edessa"/>
+        <a:font script="Orya" typeface="Kalinga"/>
+        <a:font script="Mlym" typeface="Kartika"/>
+        <a:font script="Laoo" typeface="DokChampa"/>
+        <a:font script="Sinh" typeface="Iskoola Pota"/>
+        <a:font script="Mong" typeface="Mongolian Baiti"/>
+        <a:font script="Viet" typeface="Arial"/>
+        <a:font script="Uigh" typeface="Microsoft Uighur"/>
+        <a:font script="Geor" typeface="Sylfaen"/>
+        <a:font script="Armn" typeface="Arial"/>
+        <a:font script="Bugi" typeface="Leelawadee UI"/>
+        <a:font script="Bopo" typeface="Microsoft JhengHei"/>
+        <a:font script="Java" typeface="Javanese Text"/>
+        <a:font script="Lisu" typeface="Segoe UI"/>
+        <a:font script="Mymr" typeface="Myanmar Text"/>
+        <a:font script="Nkoo" typeface="Ebrima"/>
+        <a:font script="Olck" typeface="Nirmala UI"/>
+        <a:font script="Osma" typeface="Ebrima"/>
+        <a:font script="Phag" typeface="Phagspa"/>
+        <a:font script="Syrn" typeface="Estrangelo Edessa"/>
+        <a:font script="Syrj" typeface="Estrangelo Edessa"/>
+        <a:font script="Syre" typeface="Estrangelo Edessa"/>
+        <a:font script="Sora" typeface="Nirmala UI"/>
+        <a:font script="Tale" typeface="Microsoft Tai Le"/>
+        <a:font script="Talu" typeface="Microsoft New Tai Lue"/>
+        <a:font script="Tfng" typeface="Ebrima"/>
+      </a:minorFont>
+    </a:fontScheme>
+    <a:fmtScheme name="Office">
+      <a:fillStyleLst>
+        <a:solidFill>
+          <a:schemeClr val="phClr"/>
+        </a:solidFill>
+        <a:gradFill rotWithShape="1">
+          <a:gsLst>
+            <a:gs pos="0">
+              <a:schemeClr val="phClr">
+                <a:lumMod val="110000"/>
+                <a:satMod val="105000"/>
+                <a:tint val="67000"/>
+              </a:schemeClr>
+            </a:gs>
+            <a:gs pos="50000">
+              <a:schemeClr val="phClr">
+                <a:lumMod val="105000"/>
+                <a:satMod val="103000"/>
+                <a:tint val="73000"/>
+              </a:schemeClr>
+            </a:gs>
+            <a:gs pos="100000">
+              <a:schemeClr val="phClr">
+                <a:lumMod val="105000"/>
+                <a:satMod val="109000"/>
+                <a:tint val="81000"/>
+              </a:schemeClr>
+            </a:gs>
+          </a:gsLst>
+          <a:lin ang="5400000" scaled="0"/>
+        </a:gradFill>
+        <a:gradFill rotWithShape="1">
+          <a:gsLst>
+            <a:gs pos="0">
+              <a:schemeClr val="phClr">
+                <a:satMod val="103000"/>
+                <a:lumMod val="102000"/>
+                <a:tint val="94000"/>
+              </a:schemeClr>
+            </a:gs>
+            <a:gs pos="50000">
+              <a:schemeClr val="phClr">
+                <a:satMod val="110000"/>
+                <a:lumMod val="100000"/>
+                <a:shade val="100000"/>
+              </a:schemeClr>
+            </a:gs>
+            <a:gs pos="100000">
+              <a:schemeClr val="phClr">
+                <a:lumMod val="99000"/>
+                <a:satMod val="120000"/>
+                <a:shade val="78000"/>
+              </a:schemeClr>
+            </a:gs>
+          </a:gsLst>
+          <a:lin ang="5400000" scaled="0"/>
+        </a:gradFill>
+      </a:fillStyleLst>
+      <a:lnStyleLst>
+        <a:ln w="6350" cap="flat" cmpd="sng" algn="ctr">
+          <a:solidFill>
+            <a:schemeClr val="phClr"/>
+          </a:solidFill>
+          <a:prstDash val="solid"/>
+          <a:miter lim="800000"/>
+        </a:ln>
+        <a:ln w="12700" cap="flat" cmpd="sng" algn="ctr">
+          <a:solidFill>
+            <a:schemeClr val="phClr"/>
+          </a:solidFill>
+          <a:prstDash val="solid"/>
+          <a:miter lim="800000"/>
+        </a:ln>
+        <a:ln w="19050" cap="flat" cmpd="sng" algn="ctr">
+          <a:solidFill>
+            <a:schemeClr val="phClr"/>
+          </a:solidFill>
+          <a:prstDash val="solid"/>
+          <a:miter lim="800000"/>
+        </a:ln>
+      </a:lnStyleLst>
+      <a:effectStyleLst>
+        <a:effectStyle>
+          <a:effectLst/>
+        </a:effectStyle>
+        <a:effectStyle>
+          <a:effectLst/>
+        </a:effectStyle>
+        <a:effectStyle>
+          <a:effectLst>
+            <a:outerShdw blurRad="57150" dist="19050" dir="5400000" algn="ctr" rotWithShape="0">
+              <a:srgbClr val="000000">
+                <a:alpha val="63000"/>
+              </a:srgbClr>
+            </a:outerShdw>
+          </a:effectLst>
+        </a:effectStyle>
+      </a:effectStyleLst>
+      <a:bgFillStyleLst>
+        <a:solidFill>
+          <a:schemeClr val="phClr"/>
+        </a:solidFill>
+        <a:solidFill>
+          <a:schemeClr val="phClr">
+            <a:tint val="95000"/>
+            <a:satMod val="170000"/>
+          </a:schemeClr>
+        </a:solidFill>
+        <a:gradFill rotWithShape="1">
+          <a:gsLst>
+            <a:gs pos="0">
+              <a:schemeClr val="phClr">
+                <a:tint val="93000"/>
+                <a:satMod val="150000"/>
+                <a:shade val="98000"/>
+                <a:lumMod val="102000"/>
+              </a:schemeClr>
+            </a:gs>
+            <a:gs pos="50000">
+              <a:schemeClr val="phClr">
+                <a:tint val="98000"/>
+                <a:satMod val="130000"/>
+                <a:shade val="90000"/>
+                <a:lumMod val="103000"/>
+              </a:schemeClr>
+            </a:gs>
+            <a:gs pos="100000">
+              <a:schemeClr val="phClr">
+                <a:shade val="63000"/>
+                <a:satMod val="120000"/>
+              </a:schemeClr>
+            </a:gs>
+          </a:gsLst>
+          <a:lin ang="5400000" scaled="0"/>
+        </a:gradFill>
+      </a:bgFillStyleLst>
+    </a:fmtScheme>
+  </a:themeElements>
+  <a:objectDefaults/>
+  <a:extraClrSchemeLst/>
+  <a:extLst>
+    <a:ext uri="{05A4C25C-085E-4340-85A3-A5531E510DB2}">
+      <thm15:themeFamily xmlns:thm15="http://schemas.microsoft.com/office/thememl/2012/main" name="Office Theme" id="{62F939B6-93AF-4DB8-9C6B-D6C7DFDC589F}" vid="{4A3C46E8-61CC-4603-A589-7422A47A8E4A}"/>
+    </a:ext>
+  </a:extLst>
+</a:theme>
 </file>
</xml_diff>